<commit_message>
Vetem shqip, disa ndryshime ne Prezantim
</commit_message>
<xml_diff>
--- a/Problemi_i_Tete_Mbretereshave.pptx
+++ b/Problemi_i_Tete_Mbretereshave.pptx
@@ -117,7 +117,7 @@
   </p:defaultTextStyle>
   <p:extLst>
     <p:ext uri="{EFAFB233-063F-42B5-8137-9DF3F51BA10A}">
-      <p15:sldGuideLst xmlns:p15="http://schemas.microsoft.com/office/powerpoint/2012/main" xmlns="">
+      <p15:sldGuideLst xmlns:p15="http://schemas.microsoft.com/office/powerpoint/2012/main">
         <p15:guide id="1" orient="horz" pos="2160" userDrawn="1">
           <p15:clr>
             <a:srgbClr val="A4A3A4"/>
@@ -131,7 +131,7 @@
       </p15:sldGuideLst>
     </p:ext>
     <p:ext uri="{2D200454-40CA-4A62-9FC3-DE9A4176ACB9}">
-      <p15:notesGuideLst xmlns:p15="http://schemas.microsoft.com/office/powerpoint/2012/main" xmlns=""/>
+      <p15:notesGuideLst xmlns:p15="http://schemas.microsoft.com/office/powerpoint/2012/main"/>
     </p:ext>
   </p:extLst>
 </p:presentation>
@@ -220,7 +220,7 @@
             <a:fld id="{23CEAAF3-9831-450B-8D59-2C09DB96C8FC}" type="datetimeFigureOut">
               <a:rPr lang="en-US"/>
               <a:pPr/>
-              <a:t>14-May-17</a:t>
+              <a:t>5/24/2017</a:t>
             </a:fld>
             <a:endParaRPr/>
           </a:p>
@@ -287,7 +287,7 @@
             <a:fld id="{06834459-7356-44BF-850D-8B30C4FB3B6B}" type="slidenum">
               <a:rPr/>
               <a:pPr/>
-              <a:t>‹#›</a:t>
+              <a:t>0</a:t>
             </a:fld>
             <a:endParaRPr/>
           </a:p>
@@ -296,7 +296,7 @@
     </p:spTree>
     <p:extLst>
       <p:ext uri="{BB962C8B-B14F-4D97-AF65-F5344CB8AC3E}">
-        <p14:creationId xmlns:p14="http://schemas.microsoft.com/office/powerpoint/2010/main" xmlns="" val="2469016529"/>
+        <p14:creationId xmlns:p14="http://schemas.microsoft.com/office/powerpoint/2010/main" val="2469016529"/>
       </p:ext>
     </p:extLst>
   </p:cSld>
@@ -387,7 +387,7 @@
             <a:fld id="{2D50CD79-FC16-4410-AB61-17F26E6D3BC8}" type="datetimeFigureOut">
               <a:rPr lang="en-US"/>
               <a:pPr/>
-              <a:t>14-May-17</a:t>
+              <a:t>5/24/2017</a:t>
             </a:fld>
             <a:endParaRPr/>
           </a:p>
@@ -451,35 +451,30 @@
           <a:p>
             <a:pPr lvl="0"/>
             <a:r>
-              <a:rPr/>
               <a:t>Click to edit Master text styles</a:t>
             </a:r>
           </a:p>
           <a:p>
             <a:pPr lvl="1"/>
             <a:r>
-              <a:rPr/>
               <a:t>Second level</a:t>
             </a:r>
           </a:p>
           <a:p>
             <a:pPr lvl="2"/>
             <a:r>
-              <a:rPr/>
               <a:t>Third level</a:t>
             </a:r>
           </a:p>
           <a:p>
             <a:pPr lvl="3"/>
             <a:r>
-              <a:rPr/>
               <a:t>Fourth level</a:t>
             </a:r>
           </a:p>
           <a:p>
             <a:pPr lvl="4"/>
             <a:r>
-              <a:rPr/>
               <a:t>Fifth level</a:t>
             </a:r>
           </a:p>
@@ -555,7 +550,7 @@
     </p:spTree>
     <p:extLst>
       <p:ext uri="{BB962C8B-B14F-4D97-AF65-F5344CB8AC3E}">
-        <p14:creationId xmlns:p14="http://schemas.microsoft.com/office/powerpoint/2010/main" xmlns="" val="3350842207"/>
+        <p14:creationId xmlns:p14="http://schemas.microsoft.com/office/powerpoint/2010/main" val="3350842207"/>
       </p:ext>
     </p:extLst>
   </p:cSld>
@@ -732,7 +727,7 @@
     </p:spTree>
     <p:extLst>
       <p:ext uri="{BB962C8B-B14F-4D97-AF65-F5344CB8AC3E}">
-        <p14:creationId xmlns:p14="http://schemas.microsoft.com/office/powerpoint/2010/main" xmlns="" val="2205551148"/>
+        <p14:creationId xmlns:p14="http://schemas.microsoft.com/office/powerpoint/2010/main" val="2205551148"/>
       </p:ext>
     </p:extLst>
   </p:cSld>
@@ -817,7 +812,7 @@
     </p:spTree>
     <p:extLst>
       <p:ext uri="{BB962C8B-B14F-4D97-AF65-F5344CB8AC3E}">
-        <p14:creationId xmlns:p14="http://schemas.microsoft.com/office/powerpoint/2010/main" xmlns="" val="3796805355"/>
+        <p14:creationId xmlns:p14="http://schemas.microsoft.com/office/powerpoint/2010/main" val="3796805355"/>
       </p:ext>
     </p:extLst>
   </p:cSld>
@@ -902,7 +897,7 @@
     </p:spTree>
     <p:extLst>
       <p:ext uri="{BB962C8B-B14F-4D97-AF65-F5344CB8AC3E}">
-        <p14:creationId xmlns:p14="http://schemas.microsoft.com/office/powerpoint/2010/main" xmlns="" val="3796805355"/>
+        <p14:creationId xmlns:p14="http://schemas.microsoft.com/office/powerpoint/2010/main" val="3796805355"/>
       </p:ext>
     </p:extLst>
   </p:cSld>
@@ -987,7 +982,7 @@
     </p:spTree>
     <p:extLst>
       <p:ext uri="{BB962C8B-B14F-4D97-AF65-F5344CB8AC3E}">
-        <p14:creationId xmlns:p14="http://schemas.microsoft.com/office/powerpoint/2010/main" xmlns="" val="3796805355"/>
+        <p14:creationId xmlns:p14="http://schemas.microsoft.com/office/powerpoint/2010/main" val="3796805355"/>
       </p:ext>
     </p:extLst>
   </p:cSld>
@@ -1072,7 +1067,7 @@
     </p:spTree>
     <p:extLst>
       <p:ext uri="{BB962C8B-B14F-4D97-AF65-F5344CB8AC3E}">
-        <p14:creationId xmlns:p14="http://schemas.microsoft.com/office/powerpoint/2010/main" xmlns="" val="3796805355"/>
+        <p14:creationId xmlns:p14="http://schemas.microsoft.com/office/powerpoint/2010/main" val="3796805355"/>
       </p:ext>
     </p:extLst>
   </p:cSld>
@@ -1157,7 +1152,7 @@
     </p:spTree>
     <p:extLst>
       <p:ext uri="{BB962C8B-B14F-4D97-AF65-F5344CB8AC3E}">
-        <p14:creationId xmlns:p14="http://schemas.microsoft.com/office/powerpoint/2010/main" xmlns="" val="3796805355"/>
+        <p14:creationId xmlns:p14="http://schemas.microsoft.com/office/powerpoint/2010/main" val="3796805355"/>
       </p:ext>
     </p:extLst>
   </p:cSld>
@@ -1297,7 +1292,6 @@
           </a:lstStyle>
           <a:p>
             <a:r>
-              <a:rPr/>
               <a:t>Click to edit Master title style</a:t>
             </a:r>
           </a:p>
@@ -1366,7 +1360,6 @@
           </a:lstStyle>
           <a:p>
             <a:r>
-              <a:rPr/>
               <a:t>Click to edit Master subtitle style</a:t>
             </a:r>
           </a:p>
@@ -1390,7 +1383,7 @@
             <a:fld id="{402B9795-92DC-40DC-A1CA-9A4B349D7824}" type="datetimeFigureOut">
               <a:rPr lang="en-US" smtClean="0"/>
               <a:pPr/>
-              <a:t>14-May-17</a:t>
+              <a:t>5/24/2017</a:t>
             </a:fld>
             <a:endParaRPr/>
           </a:p>
@@ -1458,7 +1451,7 @@
             </a:duotone>
             <a:extLst>
               <a:ext uri="{BEBA8EAE-BF5A-486C-A8C5-ECC9F3942E4B}">
-                <a14:imgProps xmlns:a14="http://schemas.microsoft.com/office/drawing/2010/main" xmlns="">
+                <a14:imgProps xmlns:a14="http://schemas.microsoft.com/office/drawing/2010/main">
                   <a14:imgLayer r:embed="rId3">
                     <a14:imgEffect>
                       <a14:saturation sat="30000"/>
@@ -1467,7 +1460,7 @@
                 </a14:imgProps>
               </a:ext>
               <a:ext uri="{28A0092B-C50C-407E-A947-70E740481C1C}">
-                <a14:useLocalDpi xmlns:a14="http://schemas.microsoft.com/office/drawing/2010/main" xmlns="" val="0"/>
+                <a14:useLocalDpi xmlns:a14="http://schemas.microsoft.com/office/drawing/2010/main" val="0"/>
               </a:ext>
             </a:extLst>
           </a:blip>
@@ -1487,20 +1480,20 @@
     </p:spTree>
     <p:extLst>
       <p:ext uri="{BB962C8B-B14F-4D97-AF65-F5344CB8AC3E}">
-        <p14:creationId xmlns:p14="http://schemas.microsoft.com/office/powerpoint/2010/main" xmlns="" val="1659756515"/>
+        <p14:creationId xmlns:p14="http://schemas.microsoft.com/office/powerpoint/2010/main" val="1659756515"/>
       </p:ext>
     </p:extLst>
   </p:cSld>
   <p:clrMapOvr>
     <a:masterClrMapping/>
   </p:clrMapOvr>
-  <mc:AlternateContent xmlns:mc="http://schemas.openxmlformats.org/markup-compatibility/2006">
-    <mc:Choice xmlns:p14="http://schemas.microsoft.com/office/powerpoint/2010/main" xmlns="" Requires="p14">
+  <mc:AlternateContent xmlns:mc="http://schemas.openxmlformats.org/markup-compatibility/2006" xmlns:p14="http://schemas.microsoft.com/office/powerpoint/2010/main">
+    <mc:Choice Requires="p14">
       <p:transition spd="med" p14:dur="700">
         <p:fade/>
       </p:transition>
     </mc:Choice>
-    <mc:Fallback>
+    <mc:Fallback xmlns="">
       <p:transition spd="med">
         <p:fade/>
       </p:transition>
@@ -1546,7 +1539,6 @@
           </a:lstStyle>
           <a:p>
             <a:r>
-              <a:rPr/>
               <a:t>Click to edit Master title style</a:t>
             </a:r>
           </a:p>
@@ -1679,7 +1671,6 @@
           <a:p>
             <a:pPr lvl="0"/>
             <a:r>
-              <a:rPr/>
               <a:t>Click to edit Master text styles</a:t>
             </a:r>
           </a:p>
@@ -1703,7 +1694,7 @@
             <a:fld id="{402B9795-92DC-40DC-A1CA-9A4B349D7824}" type="datetimeFigureOut">
               <a:rPr lang="en-US" smtClean="0"/>
               <a:pPr/>
-              <a:t>14-May-17</a:t>
+              <a:t>5/24/2017</a:t>
             </a:fld>
             <a:endParaRPr/>
           </a:p>
@@ -1755,20 +1746,20 @@
     </p:spTree>
     <p:extLst>
       <p:ext uri="{BB962C8B-B14F-4D97-AF65-F5344CB8AC3E}">
-        <p14:creationId xmlns:p14="http://schemas.microsoft.com/office/powerpoint/2010/main" xmlns="" val="769637093"/>
+        <p14:creationId xmlns:p14="http://schemas.microsoft.com/office/powerpoint/2010/main" val="769637093"/>
       </p:ext>
     </p:extLst>
   </p:cSld>
   <p:clrMapOvr>
     <a:masterClrMapping/>
   </p:clrMapOvr>
-  <mc:AlternateContent xmlns:mc="http://schemas.openxmlformats.org/markup-compatibility/2006">
-    <mc:Choice xmlns:p14="http://schemas.microsoft.com/office/powerpoint/2010/main" xmlns="" Requires="p14">
+  <mc:AlternateContent xmlns:mc="http://schemas.openxmlformats.org/markup-compatibility/2006" xmlns:p14="http://schemas.microsoft.com/office/powerpoint/2010/main">
+    <mc:Choice Requires="p14">
       <p:transition spd="med" p14:dur="700">
         <p:fade/>
       </p:transition>
     </mc:Choice>
-    <mc:Fallback>
+    <mc:Fallback xmlns="">
       <p:transition spd="med">
         <p:fade/>
       </p:transition>
@@ -1810,7 +1801,6 @@
           <a:lstStyle/>
           <a:p>
             <a:r>
-              <a:rPr/>
               <a:t>Click to edit Master title style</a:t>
             </a:r>
           </a:p>
@@ -1833,35 +1823,30 @@
           <a:p>
             <a:pPr lvl="0"/>
             <a:r>
-              <a:rPr/>
               <a:t>Click to edit Master text styles</a:t>
             </a:r>
           </a:p>
           <a:p>
             <a:pPr lvl="1"/>
             <a:r>
-              <a:rPr/>
               <a:t>Second level</a:t>
             </a:r>
           </a:p>
           <a:p>
             <a:pPr lvl="2"/>
             <a:r>
-              <a:rPr/>
               <a:t>Third level</a:t>
             </a:r>
           </a:p>
           <a:p>
             <a:pPr lvl="3"/>
             <a:r>
-              <a:rPr/>
               <a:t>Fourth level</a:t>
             </a:r>
           </a:p>
           <a:p>
             <a:pPr lvl="4"/>
             <a:r>
-              <a:rPr/>
               <a:t>Fifth level</a:t>
             </a:r>
           </a:p>
@@ -1885,7 +1870,7 @@
             <a:fld id="{402B9795-92DC-40DC-A1CA-9A4B349D7824}" type="datetimeFigureOut">
               <a:rPr lang="en-US" smtClean="0"/>
               <a:pPr/>
-              <a:t>14-May-17</a:t>
+              <a:t>5/24/2017</a:t>
             </a:fld>
             <a:endParaRPr/>
           </a:p>
@@ -1937,20 +1922,20 @@
     </p:spTree>
     <p:extLst>
       <p:ext uri="{BB962C8B-B14F-4D97-AF65-F5344CB8AC3E}">
-        <p14:creationId xmlns:p14="http://schemas.microsoft.com/office/powerpoint/2010/main" xmlns="" val="2012076707"/>
+        <p14:creationId xmlns:p14="http://schemas.microsoft.com/office/powerpoint/2010/main" val="2012076707"/>
       </p:ext>
     </p:extLst>
   </p:cSld>
   <p:clrMapOvr>
     <a:masterClrMapping/>
   </p:clrMapOvr>
-  <mc:AlternateContent xmlns:mc="http://schemas.openxmlformats.org/markup-compatibility/2006">
-    <mc:Choice xmlns:p14="http://schemas.microsoft.com/office/powerpoint/2010/main" xmlns="" Requires="p14">
+  <mc:AlternateContent xmlns:mc="http://schemas.openxmlformats.org/markup-compatibility/2006" xmlns:p14="http://schemas.microsoft.com/office/powerpoint/2010/main">
+    <mc:Choice Requires="p14">
       <p:transition spd="med" p14:dur="700">
         <p:fade/>
       </p:transition>
     </mc:Choice>
-    <mc:Fallback>
+    <mc:Fallback xmlns="">
       <p:transition spd="med">
         <p:fade/>
       </p:transition>
@@ -1997,7 +1982,6 @@
           <a:lstStyle/>
           <a:p>
             <a:r>
-              <a:rPr/>
               <a:t>Click to edit Master title style</a:t>
             </a:r>
           </a:p>
@@ -2025,35 +2009,30 @@
           <a:p>
             <a:pPr lvl="0"/>
             <a:r>
-              <a:rPr/>
               <a:t>Click to edit Master text styles</a:t>
             </a:r>
           </a:p>
           <a:p>
             <a:pPr lvl="1"/>
             <a:r>
-              <a:rPr/>
               <a:t>Second level</a:t>
             </a:r>
           </a:p>
           <a:p>
             <a:pPr lvl="2"/>
             <a:r>
-              <a:rPr/>
               <a:t>Third level</a:t>
             </a:r>
           </a:p>
           <a:p>
             <a:pPr lvl="3"/>
             <a:r>
-              <a:rPr/>
               <a:t>Fourth level</a:t>
             </a:r>
           </a:p>
           <a:p>
             <a:pPr lvl="4"/>
             <a:r>
-              <a:rPr/>
               <a:t>Fifth level</a:t>
             </a:r>
           </a:p>
@@ -2077,7 +2056,7 @@
             <a:fld id="{402B9795-92DC-40DC-A1CA-9A4B349D7824}" type="datetimeFigureOut">
               <a:rPr lang="en-US" smtClean="0"/>
               <a:pPr/>
-              <a:t>14-May-17</a:t>
+              <a:t>5/24/2017</a:t>
             </a:fld>
             <a:endParaRPr/>
           </a:p>
@@ -2216,20 +2195,20 @@
     </p:spTree>
     <p:extLst>
       <p:ext uri="{BB962C8B-B14F-4D97-AF65-F5344CB8AC3E}">
-        <p14:creationId xmlns:p14="http://schemas.microsoft.com/office/powerpoint/2010/main" xmlns="" val="445927127"/>
+        <p14:creationId xmlns:p14="http://schemas.microsoft.com/office/powerpoint/2010/main" val="445927127"/>
       </p:ext>
     </p:extLst>
   </p:cSld>
   <p:clrMapOvr>
     <a:masterClrMapping/>
   </p:clrMapOvr>
-  <mc:AlternateContent xmlns:mc="http://schemas.openxmlformats.org/markup-compatibility/2006">
-    <mc:Choice xmlns:p14="http://schemas.microsoft.com/office/powerpoint/2010/main" xmlns="" Requires="p14">
+  <mc:AlternateContent xmlns:mc="http://schemas.openxmlformats.org/markup-compatibility/2006" xmlns:p14="http://schemas.microsoft.com/office/powerpoint/2010/main">
+    <mc:Choice Requires="p14">
       <p:transition spd="med" p14:dur="700">
         <p:fade/>
       </p:transition>
     </mc:Choice>
-    <mc:Fallback>
+    <mc:Fallback xmlns="">
       <p:transition spd="med">
         <p:fade/>
       </p:transition>
@@ -2271,7 +2250,6 @@
           <a:lstStyle/>
           <a:p>
             <a:r>
-              <a:rPr/>
               <a:t>Click to edit Master title style</a:t>
             </a:r>
           </a:p>
@@ -2294,35 +2272,30 @@
           <a:p>
             <a:pPr lvl="0"/>
             <a:r>
-              <a:rPr/>
               <a:t>Click to edit Master text styles</a:t>
             </a:r>
           </a:p>
           <a:p>
             <a:pPr lvl="1"/>
             <a:r>
-              <a:rPr/>
               <a:t>Second level</a:t>
             </a:r>
           </a:p>
           <a:p>
             <a:pPr lvl="2"/>
             <a:r>
-              <a:rPr/>
               <a:t>Third level</a:t>
             </a:r>
           </a:p>
           <a:p>
             <a:pPr lvl="3"/>
             <a:r>
-              <a:rPr/>
               <a:t>Fourth level</a:t>
             </a:r>
           </a:p>
           <a:p>
             <a:pPr lvl="4"/>
             <a:r>
-              <a:rPr/>
               <a:t>Fifth level</a:t>
             </a:r>
           </a:p>
@@ -2346,7 +2319,7 @@
             <a:fld id="{402B9795-92DC-40DC-A1CA-9A4B349D7824}" type="datetimeFigureOut">
               <a:rPr lang="en-US" smtClean="0"/>
               <a:pPr/>
-              <a:t>14-May-17</a:t>
+              <a:t>5/24/2017</a:t>
             </a:fld>
             <a:endParaRPr/>
           </a:p>
@@ -2398,20 +2371,20 @@
     </p:spTree>
     <p:extLst>
       <p:ext uri="{BB962C8B-B14F-4D97-AF65-F5344CB8AC3E}">
-        <p14:creationId xmlns:p14="http://schemas.microsoft.com/office/powerpoint/2010/main" xmlns="" val="3786876825"/>
+        <p14:creationId xmlns:p14="http://schemas.microsoft.com/office/powerpoint/2010/main" val="3786876825"/>
       </p:ext>
     </p:extLst>
   </p:cSld>
   <p:clrMapOvr>
     <a:masterClrMapping/>
   </p:clrMapOvr>
-  <mc:AlternateContent xmlns:mc="http://schemas.openxmlformats.org/markup-compatibility/2006">
-    <mc:Choice xmlns:p14="http://schemas.microsoft.com/office/powerpoint/2010/main" xmlns="" Requires="p14">
+  <mc:AlternateContent xmlns:mc="http://schemas.openxmlformats.org/markup-compatibility/2006" xmlns:p14="http://schemas.microsoft.com/office/powerpoint/2010/main">
+    <mc:Choice Requires="p14">
       <p:transition spd="med" p14:dur="700">
         <p:fade/>
       </p:transition>
     </mc:Choice>
-    <mc:Fallback>
+    <mc:Fallback xmlns="">
       <p:transition spd="med">
         <p:fade/>
       </p:transition>
@@ -2724,7 +2697,6 @@
           </a:lstStyle>
           <a:p>
             <a:r>
-              <a:rPr/>
               <a:t>Click to edit Master title style</a:t>
             </a:r>
           </a:p>
@@ -2793,7 +2765,6 @@
           </a:lstStyle>
           <a:p>
             <a:r>
-              <a:rPr/>
               <a:t>Click to edit Master subtitle style</a:t>
             </a:r>
           </a:p>
@@ -2818,7 +2789,7 @@
             </a:duotone>
             <a:extLst>
               <a:ext uri="{BEBA8EAE-BF5A-486C-A8C5-ECC9F3942E4B}">
-                <a14:imgProps xmlns:a14="http://schemas.microsoft.com/office/drawing/2010/main" xmlns="">
+                <a14:imgProps xmlns:a14="http://schemas.microsoft.com/office/drawing/2010/main">
                   <a14:imgLayer r:embed="rId3">
                     <a14:imgEffect>
                       <a14:saturation sat="30000"/>
@@ -2827,7 +2798,7 @@
                 </a14:imgProps>
               </a:ext>
               <a:ext uri="{28A0092B-C50C-407E-A947-70E740481C1C}">
-                <a14:useLocalDpi xmlns:a14="http://schemas.microsoft.com/office/drawing/2010/main" xmlns="" val="0"/>
+                <a14:useLocalDpi xmlns:a14="http://schemas.microsoft.com/office/drawing/2010/main" val="0"/>
               </a:ext>
             </a:extLst>
           </a:blip>
@@ -2882,20 +2853,20 @@
     </p:spTree>
     <p:extLst>
       <p:ext uri="{BB962C8B-B14F-4D97-AF65-F5344CB8AC3E}">
-        <p14:creationId xmlns:p14="http://schemas.microsoft.com/office/powerpoint/2010/main" xmlns="" val="2673943605"/>
+        <p14:creationId xmlns:p14="http://schemas.microsoft.com/office/powerpoint/2010/main" val="2673943605"/>
       </p:ext>
     </p:extLst>
   </p:cSld>
   <p:clrMapOvr>
     <a:masterClrMapping/>
   </p:clrMapOvr>
-  <mc:AlternateContent xmlns:mc="http://schemas.openxmlformats.org/markup-compatibility/2006">
-    <mc:Choice xmlns:p14="http://schemas.microsoft.com/office/powerpoint/2010/main" xmlns="" Requires="p14">
+  <mc:AlternateContent xmlns:mc="http://schemas.openxmlformats.org/markup-compatibility/2006" xmlns:p14="http://schemas.microsoft.com/office/powerpoint/2010/main">
+    <mc:Choice Requires="p14">
       <p:transition spd="med" p14:dur="700">
         <p:fade/>
       </p:transition>
     </mc:Choice>
-    <mc:Fallback>
+    <mc:Fallback xmlns="">
       <p:transition spd="med">
         <p:fade/>
       </p:transition>
@@ -3187,7 +3158,6 @@
           </a:lstStyle>
           <a:p>
             <a:r>
-              <a:rPr/>
               <a:t>Click to edit Master title style</a:t>
             </a:r>
           </a:p>
@@ -3309,7 +3279,6 @@
           <a:p>
             <a:pPr lvl="0"/>
             <a:r>
-              <a:rPr/>
               <a:t>Click to edit Master text styles</a:t>
             </a:r>
           </a:p>
@@ -3333,7 +3302,7 @@
             <a:fld id="{402B9795-92DC-40DC-A1CA-9A4B349D7824}" type="datetimeFigureOut">
               <a:rPr lang="en-US" smtClean="0"/>
               <a:pPr/>
-              <a:t>14-May-17</a:t>
+              <a:t>5/24/2017</a:t>
             </a:fld>
             <a:endParaRPr/>
           </a:p>
@@ -3401,7 +3370,7 @@
             </a:duotone>
             <a:extLst>
               <a:ext uri="{28A0092B-C50C-407E-A947-70E740481C1C}">
-                <a14:useLocalDpi xmlns:a14="http://schemas.microsoft.com/office/drawing/2010/main" xmlns="" val="0"/>
+                <a14:useLocalDpi xmlns:a14="http://schemas.microsoft.com/office/drawing/2010/main" val="0"/>
               </a:ext>
             </a:extLst>
           </a:blip>
@@ -3422,20 +3391,20 @@
     </p:spTree>
     <p:extLst>
       <p:ext uri="{BB962C8B-B14F-4D97-AF65-F5344CB8AC3E}">
-        <p14:creationId xmlns:p14="http://schemas.microsoft.com/office/powerpoint/2010/main" xmlns="" val="3602678805"/>
+        <p14:creationId xmlns:p14="http://schemas.microsoft.com/office/powerpoint/2010/main" val="3602678805"/>
       </p:ext>
     </p:extLst>
   </p:cSld>
   <p:clrMapOvr>
     <a:masterClrMapping/>
   </p:clrMapOvr>
-  <mc:AlternateContent xmlns:mc="http://schemas.openxmlformats.org/markup-compatibility/2006">
-    <mc:Choice xmlns:p14="http://schemas.microsoft.com/office/powerpoint/2010/main" xmlns="" Requires="p14">
+  <mc:AlternateContent xmlns:mc="http://schemas.openxmlformats.org/markup-compatibility/2006" xmlns:p14="http://schemas.microsoft.com/office/powerpoint/2010/main">
+    <mc:Choice Requires="p14">
       <p:transition spd="med" p14:dur="700">
         <p:fade/>
       </p:transition>
     </mc:Choice>
-    <mc:Fallback>
+    <mc:Fallback xmlns="">
       <p:transition spd="med">
         <p:fade/>
       </p:transition>
@@ -3477,7 +3446,6 @@
           <a:lstStyle/>
           <a:p>
             <a:r>
-              <a:rPr/>
               <a:t>Click to edit Master title style</a:t>
             </a:r>
           </a:p>
@@ -3521,35 +3489,30 @@
           <a:p>
             <a:pPr lvl="0"/>
             <a:r>
-              <a:rPr/>
               <a:t>Click to edit Master text styles</a:t>
             </a:r>
           </a:p>
           <a:p>
             <a:pPr lvl="1"/>
             <a:r>
-              <a:rPr/>
               <a:t>Second level</a:t>
             </a:r>
           </a:p>
           <a:p>
             <a:pPr lvl="2"/>
             <a:r>
-              <a:rPr/>
               <a:t>Third level</a:t>
             </a:r>
           </a:p>
           <a:p>
             <a:pPr lvl="3"/>
             <a:r>
-              <a:rPr/>
               <a:t>Fourth level</a:t>
             </a:r>
           </a:p>
           <a:p>
             <a:pPr lvl="4"/>
             <a:r>
-              <a:rPr/>
               <a:t>Fifth level</a:t>
             </a:r>
           </a:p>
@@ -3590,35 +3553,30 @@
           <a:p>
             <a:pPr lvl="0"/>
             <a:r>
-              <a:rPr/>
               <a:t>Click to edit Master text styles</a:t>
             </a:r>
           </a:p>
           <a:p>
             <a:pPr lvl="1"/>
             <a:r>
-              <a:rPr/>
               <a:t>Second level</a:t>
             </a:r>
           </a:p>
           <a:p>
             <a:pPr lvl="2"/>
             <a:r>
-              <a:rPr/>
               <a:t>Third level</a:t>
             </a:r>
           </a:p>
           <a:p>
             <a:pPr lvl="3"/>
             <a:r>
-              <a:rPr/>
               <a:t>Fourth level</a:t>
             </a:r>
           </a:p>
           <a:p>
             <a:pPr lvl="4"/>
             <a:r>
-              <a:rPr/>
               <a:t>Fifth level</a:t>
             </a:r>
           </a:p>
@@ -3642,7 +3600,7 @@
             <a:fld id="{402B9795-92DC-40DC-A1CA-9A4B349D7824}" type="datetimeFigureOut">
               <a:rPr lang="en-US" smtClean="0"/>
               <a:pPr/>
-              <a:t>14-May-17</a:t>
+              <a:t>5/24/2017</a:t>
             </a:fld>
             <a:endParaRPr/>
           </a:p>
@@ -3694,20 +3652,20 @@
     </p:spTree>
     <p:extLst>
       <p:ext uri="{BB962C8B-B14F-4D97-AF65-F5344CB8AC3E}">
-        <p14:creationId xmlns:p14="http://schemas.microsoft.com/office/powerpoint/2010/main" xmlns="" val="3527791066"/>
+        <p14:creationId xmlns:p14="http://schemas.microsoft.com/office/powerpoint/2010/main" val="3527791066"/>
       </p:ext>
     </p:extLst>
   </p:cSld>
   <p:clrMapOvr>
     <a:masterClrMapping/>
   </p:clrMapOvr>
-  <mc:AlternateContent xmlns:mc="http://schemas.openxmlformats.org/markup-compatibility/2006">
-    <mc:Choice xmlns:p14="http://schemas.microsoft.com/office/powerpoint/2010/main" xmlns="" Requires="p14">
+  <mc:AlternateContent xmlns:mc="http://schemas.openxmlformats.org/markup-compatibility/2006" xmlns:p14="http://schemas.microsoft.com/office/powerpoint/2010/main">
+    <mc:Choice Requires="p14">
       <p:transition spd="med" p14:dur="700">
         <p:fade/>
       </p:transition>
     </mc:Choice>
-    <mc:Fallback>
+    <mc:Fallback xmlns="">
       <p:transition spd="med">
         <p:fade/>
       </p:transition>
@@ -3749,7 +3707,6 @@
           <a:lstStyle/>
           <a:p>
             <a:r>
-              <a:rPr/>
               <a:t>Click to edit Master title style</a:t>
             </a:r>
           </a:p>
@@ -3817,7 +3774,6 @@
           <a:p>
             <a:pPr lvl="0"/>
             <a:r>
-              <a:rPr/>
               <a:t>Click to edit Master text styles</a:t>
             </a:r>
           </a:p>
@@ -3845,35 +3801,30 @@
           <a:p>
             <a:pPr lvl="0"/>
             <a:r>
-              <a:rPr/>
               <a:t>Click to edit Master text styles</a:t>
             </a:r>
           </a:p>
           <a:p>
             <a:pPr lvl="1"/>
             <a:r>
-              <a:rPr/>
               <a:t>Second level</a:t>
             </a:r>
           </a:p>
           <a:p>
             <a:pPr lvl="2"/>
             <a:r>
-              <a:rPr/>
               <a:t>Third level</a:t>
             </a:r>
           </a:p>
           <a:p>
             <a:pPr lvl="3"/>
             <a:r>
-              <a:rPr/>
               <a:t>Fourth level</a:t>
             </a:r>
           </a:p>
           <a:p>
             <a:pPr lvl="4"/>
             <a:r>
-              <a:rPr/>
               <a:t>Fifth level</a:t>
             </a:r>
           </a:p>
@@ -3941,7 +3892,6 @@
           <a:p>
             <a:pPr lvl="0"/>
             <a:r>
-              <a:rPr/>
               <a:t>Click to edit Master text styles</a:t>
             </a:r>
           </a:p>
@@ -3969,35 +3919,30 @@
           <a:p>
             <a:pPr lvl="0"/>
             <a:r>
-              <a:rPr/>
               <a:t>Click to edit Master text styles</a:t>
             </a:r>
           </a:p>
           <a:p>
             <a:pPr lvl="1"/>
             <a:r>
-              <a:rPr/>
               <a:t>Second level</a:t>
             </a:r>
           </a:p>
           <a:p>
             <a:pPr lvl="2"/>
             <a:r>
-              <a:rPr/>
               <a:t>Third level</a:t>
             </a:r>
           </a:p>
           <a:p>
             <a:pPr lvl="3"/>
             <a:r>
-              <a:rPr/>
               <a:t>Fourth level</a:t>
             </a:r>
           </a:p>
           <a:p>
             <a:pPr lvl="4"/>
             <a:r>
-              <a:rPr/>
               <a:t>Fifth level</a:t>
             </a:r>
           </a:p>
@@ -4021,7 +3966,7 @@
             <a:fld id="{402B9795-92DC-40DC-A1CA-9A4B349D7824}" type="datetimeFigureOut">
               <a:rPr lang="en-US" smtClean="0"/>
               <a:pPr/>
-              <a:t>14-May-17</a:t>
+              <a:t>5/24/2017</a:t>
             </a:fld>
             <a:endParaRPr/>
           </a:p>
@@ -4073,20 +4018,20 @@
     </p:spTree>
     <p:extLst>
       <p:ext uri="{BB962C8B-B14F-4D97-AF65-F5344CB8AC3E}">
-        <p14:creationId xmlns:p14="http://schemas.microsoft.com/office/powerpoint/2010/main" xmlns="" val="3971016106"/>
+        <p14:creationId xmlns:p14="http://schemas.microsoft.com/office/powerpoint/2010/main" val="3971016106"/>
       </p:ext>
     </p:extLst>
   </p:cSld>
   <p:clrMapOvr>
     <a:masterClrMapping/>
   </p:clrMapOvr>
-  <mc:AlternateContent xmlns:mc="http://schemas.openxmlformats.org/markup-compatibility/2006">
-    <mc:Choice xmlns:p14="http://schemas.microsoft.com/office/powerpoint/2010/main" xmlns="" Requires="p14">
+  <mc:AlternateContent xmlns:mc="http://schemas.openxmlformats.org/markup-compatibility/2006" xmlns:p14="http://schemas.microsoft.com/office/powerpoint/2010/main">
+    <mc:Choice Requires="p14">
       <p:transition spd="med" p14:dur="700">
         <p:fade/>
       </p:transition>
     </mc:Choice>
-    <mc:Fallback>
+    <mc:Fallback xmlns="">
       <p:transition spd="med">
         <p:fade/>
       </p:transition>
@@ -4128,7 +4073,6 @@
           <a:lstStyle/>
           <a:p>
             <a:r>
-              <a:rPr/>
               <a:t>Click to edit Master title style</a:t>
             </a:r>
           </a:p>
@@ -4152,7 +4096,7 @@
             <a:fld id="{402B9795-92DC-40DC-A1CA-9A4B349D7824}" type="datetimeFigureOut">
               <a:rPr lang="en-US" smtClean="0"/>
               <a:pPr/>
-              <a:t>14-May-17</a:t>
+              <a:t>5/24/2017</a:t>
             </a:fld>
             <a:endParaRPr/>
           </a:p>
@@ -4204,20 +4148,20 @@
     </p:spTree>
     <p:extLst>
       <p:ext uri="{BB962C8B-B14F-4D97-AF65-F5344CB8AC3E}">
-        <p14:creationId xmlns:p14="http://schemas.microsoft.com/office/powerpoint/2010/main" xmlns="" val="1758111529"/>
+        <p14:creationId xmlns:p14="http://schemas.microsoft.com/office/powerpoint/2010/main" val="1758111529"/>
       </p:ext>
     </p:extLst>
   </p:cSld>
   <p:clrMapOvr>
     <a:masterClrMapping/>
   </p:clrMapOvr>
-  <mc:AlternateContent xmlns:mc="http://schemas.openxmlformats.org/markup-compatibility/2006">
-    <mc:Choice xmlns:p14="http://schemas.microsoft.com/office/powerpoint/2010/main" xmlns="" Requires="p14">
+  <mc:AlternateContent xmlns:mc="http://schemas.openxmlformats.org/markup-compatibility/2006" xmlns:p14="http://schemas.microsoft.com/office/powerpoint/2010/main">
+    <mc:Choice Requires="p14">
       <p:transition spd="med" p14:dur="700">
         <p:fade/>
       </p:transition>
     </mc:Choice>
-    <mc:Fallback>
+    <mc:Fallback xmlns="">
       <p:transition spd="med">
         <p:fade/>
       </p:transition>
@@ -4261,7 +4205,7 @@
             <a:fld id="{402B9795-92DC-40DC-A1CA-9A4B349D7824}" type="datetimeFigureOut">
               <a:rPr lang="en-US" smtClean="0"/>
               <a:pPr/>
-              <a:t>14-May-17</a:t>
+              <a:t>5/24/2017</a:t>
             </a:fld>
             <a:endParaRPr/>
           </a:p>
@@ -4313,20 +4257,20 @@
     </p:spTree>
     <p:extLst>
       <p:ext uri="{BB962C8B-B14F-4D97-AF65-F5344CB8AC3E}">
-        <p14:creationId xmlns:p14="http://schemas.microsoft.com/office/powerpoint/2010/main" xmlns="" val="302416926"/>
+        <p14:creationId xmlns:p14="http://schemas.microsoft.com/office/powerpoint/2010/main" val="302416926"/>
       </p:ext>
     </p:extLst>
   </p:cSld>
   <p:clrMapOvr>
     <a:masterClrMapping/>
   </p:clrMapOvr>
-  <mc:AlternateContent xmlns:mc="http://schemas.openxmlformats.org/markup-compatibility/2006">
-    <mc:Choice xmlns:p14="http://schemas.microsoft.com/office/powerpoint/2010/main" xmlns="" Requires="p14">
+  <mc:AlternateContent xmlns:mc="http://schemas.openxmlformats.org/markup-compatibility/2006" xmlns:p14="http://schemas.microsoft.com/office/powerpoint/2010/main">
+    <mc:Choice Requires="p14">
       <p:transition spd="med" p14:dur="700">
         <p:fade/>
       </p:transition>
     </mc:Choice>
-    <mc:Fallback>
+    <mc:Fallback xmlns="">
       <p:transition spd="med">
         <p:fade/>
       </p:transition>
@@ -4372,7 +4316,6 @@
           </a:lstStyle>
           <a:p>
             <a:r>
-              <a:rPr/>
               <a:t>Click to edit Master title style</a:t>
             </a:r>
           </a:p>
@@ -4430,35 +4373,30 @@
           <a:p>
             <a:pPr lvl="0"/>
             <a:r>
-              <a:rPr/>
               <a:t>Click to edit Master text styles</a:t>
             </a:r>
           </a:p>
           <a:p>
             <a:pPr lvl="1"/>
             <a:r>
-              <a:rPr/>
               <a:t>Second level</a:t>
             </a:r>
           </a:p>
           <a:p>
             <a:pPr lvl="2"/>
             <a:r>
-              <a:rPr/>
               <a:t>Third level</a:t>
             </a:r>
           </a:p>
           <a:p>
             <a:pPr lvl="3"/>
             <a:r>
-              <a:rPr/>
               <a:t>Fourth level</a:t>
             </a:r>
           </a:p>
           <a:p>
             <a:pPr lvl="4"/>
             <a:r>
-              <a:rPr/>
               <a:t>Fifth level</a:t>
             </a:r>
           </a:p>
@@ -4528,7 +4466,6 @@
           <a:p>
             <a:pPr lvl="0"/>
             <a:r>
-              <a:rPr/>
               <a:t>Click to edit Master text styles</a:t>
             </a:r>
           </a:p>
@@ -4552,7 +4489,7 @@
             <a:fld id="{402B9795-92DC-40DC-A1CA-9A4B349D7824}" type="datetimeFigureOut">
               <a:rPr lang="en-US" smtClean="0"/>
               <a:pPr/>
-              <a:t>14-May-17</a:t>
+              <a:t>5/24/2017</a:t>
             </a:fld>
             <a:endParaRPr/>
           </a:p>
@@ -4604,20 +4541,20 @@
     </p:spTree>
     <p:extLst>
       <p:ext uri="{BB962C8B-B14F-4D97-AF65-F5344CB8AC3E}">
-        <p14:creationId xmlns:p14="http://schemas.microsoft.com/office/powerpoint/2010/main" xmlns="" val="3769764688"/>
+        <p14:creationId xmlns:p14="http://schemas.microsoft.com/office/powerpoint/2010/main" val="3769764688"/>
       </p:ext>
     </p:extLst>
   </p:cSld>
   <p:clrMapOvr>
     <a:masterClrMapping/>
   </p:clrMapOvr>
-  <mc:AlternateContent xmlns:mc="http://schemas.openxmlformats.org/markup-compatibility/2006">
-    <mc:Choice xmlns:p14="http://schemas.microsoft.com/office/powerpoint/2010/main" xmlns="" Requires="p14">
+  <mc:AlternateContent xmlns:mc="http://schemas.openxmlformats.org/markup-compatibility/2006" xmlns:p14="http://schemas.microsoft.com/office/powerpoint/2010/main">
+    <mc:Choice Requires="p14">
       <p:transition spd="med" p14:dur="700">
         <p:fade/>
       </p:transition>
     </mc:Choice>
-    <mc:Fallback>
+    <mc:Fallback xmlns="">
       <p:transition spd="med">
         <p:fade/>
       </p:transition>
@@ -4674,7 +4611,6 @@
           <a:lstStyle/>
           <a:p>
             <a:r>
-              <a:rPr/>
               <a:t>Click to edit Master title style</a:t>
             </a:r>
           </a:p>
@@ -4707,63 +4643,54 @@
           <a:p>
             <a:pPr lvl="0"/>
             <a:r>
-              <a:rPr/>
               <a:t>Click to edit Master text styles</a:t>
             </a:r>
           </a:p>
           <a:p>
             <a:pPr lvl="1"/>
             <a:r>
-              <a:rPr/>
               <a:t>Second level</a:t>
             </a:r>
           </a:p>
           <a:p>
             <a:pPr lvl="2"/>
             <a:r>
-              <a:rPr/>
               <a:t>Third level</a:t>
             </a:r>
           </a:p>
           <a:p>
             <a:pPr lvl="3"/>
             <a:r>
-              <a:rPr/>
               <a:t>Fourth level</a:t>
             </a:r>
           </a:p>
           <a:p>
             <a:pPr lvl="4"/>
             <a:r>
-              <a:rPr/>
               <a:t>Fifth level</a:t>
             </a:r>
           </a:p>
           <a:p>
             <a:pPr lvl="5"/>
             <a:r>
-              <a:rPr/>
               <a:t>Sixth level</a:t>
             </a:r>
           </a:p>
           <a:p>
             <a:pPr lvl="6"/>
             <a:r>
-              <a:rPr/>
               <a:t>Seventh level</a:t>
             </a:r>
           </a:p>
           <a:p>
             <a:pPr lvl="7"/>
             <a:r>
-              <a:rPr/>
               <a:t>Eighth level</a:t>
             </a:r>
           </a:p>
           <a:p>
             <a:pPr lvl="8"/>
             <a:r>
-              <a:rPr/>
               <a:t>Ninth level</a:t>
             </a:r>
           </a:p>
@@ -4806,7 +4733,7 @@
             <a:fld id="{402B9795-92DC-40DC-A1CA-9A4B349D7824}" type="datetimeFigureOut">
               <a:rPr lang="en-US" smtClean="0"/>
               <a:pPr/>
-              <a:t>14-May-17</a:t>
+              <a:t>5/24/2017</a:t>
             </a:fld>
             <a:endParaRPr/>
           </a:p>
@@ -4983,7 +4910,7 @@
     </p:spTree>
     <p:extLst>
       <p:ext uri="{BB962C8B-B14F-4D97-AF65-F5344CB8AC3E}">
-        <p14:creationId xmlns:p14="http://schemas.microsoft.com/office/powerpoint/2010/main" xmlns="" val="2346251051"/>
+        <p14:creationId xmlns:p14="http://schemas.microsoft.com/office/powerpoint/2010/main" val="2346251051"/>
       </p:ext>
     </p:extLst>
   </p:cSld>
@@ -5002,13 +4929,13 @@
     <p:sldLayoutId id="2147483658" r:id="rId11"/>
     <p:sldLayoutId id="2147483659" r:id="rId12"/>
   </p:sldLayoutIdLst>
-  <mc:AlternateContent xmlns:mc="http://schemas.openxmlformats.org/markup-compatibility/2006">
-    <mc:Choice xmlns:p14="http://schemas.microsoft.com/office/powerpoint/2010/main" xmlns="" Requires="p14">
+  <mc:AlternateContent xmlns:mc="http://schemas.openxmlformats.org/markup-compatibility/2006" xmlns:p14="http://schemas.microsoft.com/office/powerpoint/2010/main">
+    <mc:Choice Requires="p14">
       <p:transition spd="med" p14:dur="700">
         <p:fade/>
       </p:transition>
     </mc:Choice>
-    <mc:Fallback>
+    <mc:Fallback xmlns="">
       <p:transition spd="med">
         <p:fade/>
       </p:transition>
@@ -5296,7 +5223,7 @@
   </p:txStyles>
   <p:extLst mod="1">
     <p:ext uri="{27BBF7A9-308A-43DC-89C8-2F10F3537804}">
-      <p15:sldGuideLst xmlns:p15="http://schemas.microsoft.com/office/powerpoint/2012/main" xmlns="">
+      <p15:sldGuideLst xmlns:p15="http://schemas.microsoft.com/office/powerpoint/2012/main">
         <p15:guide id="1" pos="696">
           <p15:clr>
             <a:srgbClr val="F26B43"/>
@@ -5361,18 +5288,9 @@
           <a:lstStyle/>
           <a:p>
             <a:r>
-              <a:rPr lang="sq-AL" smtClean="0"/>
-              <a:t>Problemi</a:t>
-            </a:r>
-            <a:r>
-              <a:rPr lang="sq-AL" smtClean="0"/>
-              <a:t> i tetË </a:t>
-            </a:r>
-            <a:r>
-              <a:rPr lang="sq-AL" smtClean="0"/>
-              <a:t>mbretËreshave</a:t>
-            </a:r>
-            <a:endParaRPr lang="sq-AL"/>
+              <a:rPr lang="sq-AL"/>
+              <a:t>Problemi i tetË mbretËreshave</a:t>
+            </a:r>
           </a:p>
         </p:txBody>
       </p:sp>
@@ -5392,18 +5310,9 @@
           <a:lstStyle/>
           <a:p>
             <a:r>
-              <a:rPr lang="sq-AL" smtClean="0"/>
-              <a:t>Dizajni</a:t>
-            </a:r>
-            <a:r>
-              <a:rPr lang="sq-AL" smtClean="0"/>
-              <a:t> dhe analiza e algoritmit për zgjidhjen e </a:t>
-            </a:r>
-            <a:r>
-              <a:rPr lang="sq-AL" smtClean="0"/>
-              <a:t>problemit</a:t>
-            </a:r>
-            <a:endParaRPr lang="sq-AL"/>
+              <a:rPr lang="sq-AL"/>
+              <a:t>Dizajni dhe analiza e algoritmit për zgjidhjen e problemit</a:t>
+            </a:r>
           </a:p>
         </p:txBody>
       </p:sp>
@@ -5467,103 +5376,58 @@
           <a:p>
             <a:pPr algn="ctr"/>
             <a:r>
-              <a:rPr lang="sq-AL" sz="2000" smtClean="0">
+              <a:rPr lang="sq-AL" sz="2000">
                 <a:solidFill>
                   <a:schemeClr val="bg1"/>
                 </a:solidFill>
                 <a:latin typeface="+mj-lt"/>
               </a:rPr>
-              <a:t>Florim</a:t>
-            </a:r>
-            <a:r>
-              <a:rPr lang="sq-AL" sz="2000" smtClean="0">
-                <a:solidFill>
-                  <a:schemeClr val="bg1"/>
-                </a:solidFill>
-                <a:latin typeface="+mj-lt"/>
-              </a:rPr>
-              <a:t> </a:t>
-            </a:r>
-            <a:r>
-              <a:rPr lang="sq-AL" sz="2000" smtClean="0">
-                <a:solidFill>
-                  <a:schemeClr val="bg1"/>
-                </a:solidFill>
-                <a:latin typeface="+mj-lt"/>
-              </a:rPr>
-              <a:t>Hamiti</a:t>
-            </a:r>
-            <a:r>
-              <a:rPr lang="sq-AL" sz="2000" smtClean="0">
-                <a:solidFill>
-                  <a:schemeClr val="bg1"/>
-                </a:solidFill>
-                <a:latin typeface="+mj-lt"/>
-              </a:rPr>
-              <a:t>	</a:t>
-            </a:r>
-            <a:r>
-              <a:rPr lang="sq-AL" sz="2000" smtClean="0">
-                <a:solidFill>
-                  <a:schemeClr val="bg1"/>
-                </a:solidFill>
-                <a:latin typeface="+mj-lt"/>
-              </a:rPr>
-              <a:t>	Gresa </a:t>
-            </a:r>
-            <a:r>
-              <a:rPr lang="sq-AL" sz="2000" smtClean="0">
-                <a:solidFill>
-                  <a:schemeClr val="bg1"/>
-                </a:solidFill>
-                <a:latin typeface="+mj-lt"/>
-              </a:rPr>
-              <a:t>Shala</a:t>
-            </a:r>
-            <a:r>
-              <a:rPr lang="sq-AL" sz="2000" smtClean="0">
-                <a:solidFill>
-                  <a:schemeClr val="bg1"/>
-                </a:solidFill>
-                <a:latin typeface="+mj-lt"/>
-              </a:rPr>
-              <a:t>	</a:t>
-            </a:r>
-            <a:r>
-              <a:rPr lang="sq-AL" sz="2000" smtClean="0">
-                <a:solidFill>
-                  <a:schemeClr val="bg1"/>
-                </a:solidFill>
-                <a:latin typeface="+mj-lt"/>
-              </a:rPr>
-              <a:t>	Valentina Shabani     </a:t>
-            </a:r>
-            <a:endParaRPr lang="sq-AL" sz="2000">
-              <a:solidFill>
-                <a:schemeClr val="bg1"/>
-              </a:solidFill>
-              <a:latin typeface="+mj-lt"/>
-            </a:endParaRPr>
-          </a:p>
-        </p:txBody>
-      </p:sp>
+              <a:t>Florim Hamiti		Gresa Shala		Valentina Shabani     </a:t>
+            </a:r>
+          </a:p>
+        </p:txBody>
+      </p:sp>
+      <p:pic>
+        <p:nvPicPr>
+          <p:cNvPr id="10" name="Picture 10" descr="UP-logo.gif"/>
+          <p:cNvPicPr>
+            <a:picLocks noChangeAspect="1"/>
+          </p:cNvPicPr>
+          <p:nvPr/>
+        </p:nvPicPr>
+        <p:blipFill>
+          <a:blip r:embed="rId4"/>
+          <a:stretch>
+            <a:fillRect/>
+          </a:stretch>
+        </p:blipFill>
+        <p:spPr>
+          <a:xfrm>
+            <a:off x="-47625" y="76200"/>
+            <a:ext cx="1456439" cy="971271"/>
+          </a:xfrm>
+          <a:prstGeom prst="rect">
+            <a:avLst/>
+          </a:prstGeom>
+        </p:spPr>
+      </p:pic>
     </p:spTree>
     <p:extLst>
       <p:ext uri="{BB962C8B-B14F-4D97-AF65-F5344CB8AC3E}">
-        <p14:creationId xmlns:p14="http://schemas.microsoft.com/office/powerpoint/2010/main" xmlns="" val="1652133998"/>
+        <p14:creationId xmlns:p14="http://schemas.microsoft.com/office/powerpoint/2010/main" val="1652133998"/>
       </p:ext>
     </p:extLst>
   </p:cSld>
   <p:clrMapOvr>
     <a:masterClrMapping/>
   </p:clrMapOvr>
-  <mc:AlternateContent xmlns:mc="http://schemas.openxmlformats.org/markup-compatibility/2006">
-    <mc:Choice xmlns:p14="http://schemas.microsoft.com/office/powerpoint/2010/main" xmlns="" Requires="p14">
+  <mc:AlternateContent xmlns:mc="http://schemas.openxmlformats.org/markup-compatibility/2006" xmlns:p14="http://schemas.microsoft.com/office/powerpoint/2010/main">
+    <mc:Choice Requires="p14">
       <p:transition spd="med" p14:dur="700">
         <p:fade/>
       </p:transition>
     </mc:Choice>
-    <mc:Fallback>
+    <mc:Fallback xmlns="">
       <p:transition spd="med">
         <p:fade/>
       </p:transition>
@@ -5607,10 +5471,9 @@
           <a:lstStyle/>
           <a:p>
             <a:r>
-              <a:rPr lang="sq-AL" sz="3600" smtClean="0"/>
+              <a:rPr lang="sq-AL" sz="3600" dirty="0"/>
               <a:t>Përmbajtja</a:t>
             </a:r>
-            <a:endParaRPr lang="sq-AL" sz="3600"/>
           </a:p>
         </p:txBody>
       </p:sp>
@@ -5632,47 +5495,27 @@
           <a:lstStyle/>
           <a:p>
             <a:r>
-              <a:rPr lang="sq-AL" sz="2800" smtClean="0"/>
-              <a:t>Përshkrimi</a:t>
-            </a:r>
-            <a:r>
-              <a:rPr lang="sq-AL" sz="2800" smtClean="0"/>
-              <a:t> i </a:t>
-            </a:r>
-            <a:r>
-              <a:rPr lang="sq-AL" sz="2800" smtClean="0"/>
-              <a:t>problemit</a:t>
-            </a:r>
-            <a:endParaRPr lang="sq-AL" sz="2800" smtClean="0"/>
-          </a:p>
-          <a:p>
-            <a:r>
-              <a:rPr lang="sq-AL" sz="2800" smtClean="0"/>
-              <a:t>Modeli </a:t>
-            </a:r>
-            <a:r>
-              <a:rPr lang="sq-AL" sz="2800" smtClean="0"/>
-              <a:t>matematik</a:t>
-            </a:r>
-            <a:endParaRPr lang="sq-AL" sz="2800" smtClean="0"/>
-          </a:p>
-          <a:p>
-            <a:r>
-              <a:rPr lang="sq-AL" sz="2800" smtClean="0"/>
-              <a:t>Zgjidhja kompjuterike-Backtracking </a:t>
-            </a:r>
-            <a:r>
-              <a:rPr lang="sq-AL" sz="2800" smtClean="0"/>
-              <a:t>algoritmi</a:t>
-            </a:r>
-            <a:endParaRPr lang="sq-AL" sz="2800" smtClean="0"/>
-          </a:p>
-          <a:p>
-            <a:r>
-              <a:rPr lang="sq-AL" sz="2800" smtClean="0"/>
+              <a:rPr lang="sq-AL" sz="2800"/>
+              <a:t>Përshkrimi i problemit</a:t>
+            </a:r>
+          </a:p>
+          <a:p>
+            <a:r>
+              <a:rPr lang="sq-AL" sz="2800"/>
+              <a:t>Modeli matematik</a:t>
+            </a:r>
+          </a:p>
+          <a:p>
+            <a:r>
+              <a:rPr lang="sq-AL" sz="2800"/>
+              <a:t>Zgjidhja kompjuterike-Backtracking algoritmi</a:t>
+            </a:r>
+          </a:p>
+          <a:p>
+            <a:r>
+              <a:rPr lang="sq-AL" sz="2800"/>
               <a:t>Pseudokodi</a:t>
             </a:r>
-            <a:endParaRPr lang="sq-AL" sz="2800"/>
           </a:p>
         </p:txBody>
       </p:sp>
@@ -5700,35 +5543,52 @@
           </a:prstGeom>
         </p:spPr>
       </p:pic>
+      <p:pic>
+        <p:nvPicPr>
+          <p:cNvPr id="3" name="Picture 10" descr="UP-logo.gif"/>
+          <p:cNvPicPr>
+            <a:picLocks noChangeAspect="1"/>
+          </p:cNvPicPr>
+          <p:nvPr/>
+        </p:nvPicPr>
+        <p:blipFill>
+          <a:blip r:embed="rId4"/>
+          <a:stretch>
+            <a:fillRect/>
+          </a:stretch>
+        </p:blipFill>
+        <p:spPr>
+          <a:xfrm>
+            <a:off x="-47625" y="76200"/>
+            <a:ext cx="1456439" cy="971271"/>
+          </a:xfrm>
+          <a:prstGeom prst="rect">
+            <a:avLst/>
+          </a:prstGeom>
+        </p:spPr>
+      </p:pic>
     </p:spTree>
     <p:extLst>
       <p:ext uri="{BB962C8B-B14F-4D97-AF65-F5344CB8AC3E}">
-        <p14:creationId xmlns:p14="http://schemas.microsoft.com/office/powerpoint/2010/main" xmlns="" val="1654255301"/>
+        <p14:creationId xmlns:p14="http://schemas.microsoft.com/office/powerpoint/2010/main" val="1654255301"/>
       </p:ext>
     </p:extLst>
   </p:cSld>
   <p:clrMapOvr>
     <a:masterClrMapping/>
   </p:clrMapOvr>
-  <mc:AlternateContent xmlns:mc="http://schemas.openxmlformats.org/markup-compatibility/2006">
-    <mc:Choice xmlns:p14="http://schemas.microsoft.com/office/powerpoint/2010/main" xmlns="" Requires="p14">
+  <mc:AlternateContent xmlns:mc="http://schemas.openxmlformats.org/markup-compatibility/2006" xmlns:p14="http://schemas.microsoft.com/office/powerpoint/2010/main">
+    <mc:Choice Requires="p14">
       <p:transition spd="med" p14:dur="700">
         <p:fade/>
       </p:transition>
     </mc:Choice>
-    <mc:Fallback>
+    <mc:Fallback xmlns="">
       <p:transition spd="med">
         <p:fade/>
       </p:transition>
     </mc:Fallback>
   </mc:AlternateContent>
-  <p:timing>
-    <p:tnLst>
-      <p:par>
-        <p:cTn id="1" dur="indefinite" restart="never" nodeType="tmRoot"/>
-      </p:par>
-    </p:tnLst>
-  </p:timing>
 </p:sld>
 </file>
 
@@ -5767,18 +5627,9 @@
           <a:lstStyle/>
           <a:p>
             <a:r>
-              <a:rPr lang="sq-AL" sz="3600" smtClean="0"/>
-              <a:t>Përshkrimi</a:t>
-            </a:r>
-            <a:r>
-              <a:rPr lang="sq-AL" sz="3600" smtClean="0"/>
-              <a:t> i </a:t>
-            </a:r>
-            <a:r>
-              <a:rPr lang="sq-AL" sz="3600" smtClean="0"/>
-              <a:t>problemit</a:t>
-            </a:r>
-            <a:endParaRPr lang="sq-AL" sz="3600"/>
+              <a:rPr lang="sq-AL" sz="3600"/>
+              <a:t>Përshkrimi i problemit</a:t>
+            </a:r>
           </a:p>
         </p:txBody>
       </p:sp>
@@ -5798,7 +5649,7 @@
           <a:lstStyle/>
           <a:p>
             <a:r>
-              <a:rPr lang="sq-AL" sz="3200" smtClean="0">
+              <a:rPr lang="sq-AL" sz="3200">
                 <a:solidFill>
                   <a:schemeClr val="tx1">
                     <a:lumMod val="60000"/>
@@ -5809,18 +5660,13 @@
               <a:t>Sfida</a:t>
             </a:r>
             <a:r>
-              <a:rPr lang="sq-AL" sz="3200" smtClean="0"/>
-              <a:t>: Vendosja e 8 mbretëreshave në një hapësirë 8x8 </a:t>
-            </a:r>
-            <a:r>
-              <a:rPr lang="sq-AL" sz="3200" smtClean="0"/>
-              <a:t>dimensionale</a:t>
-            </a:r>
-            <a:endParaRPr lang="sq-AL" sz="3200" smtClean="0"/>
-          </a:p>
-          <a:p>
-            <a:r>
-              <a:rPr lang="sq-AL" sz="3200" smtClean="0">
+              <a:rPr lang="sq-AL" sz="3200"/>
+              <a:t>: Vendosja e 8 mbretëreshave në një hapësirë 8x8 dimensionale</a:t>
+            </a:r>
+          </a:p>
+          <a:p>
+            <a:r>
+              <a:rPr lang="sq-AL" sz="3200">
                 <a:solidFill>
                   <a:srgbClr val="C00000"/>
                 </a:solidFill>
@@ -5828,26 +5674,13 @@
               <a:t>Kushti</a:t>
             </a:r>
             <a:r>
-              <a:rPr lang="sq-AL" sz="3200" smtClean="0"/>
-              <a:t>: </a:t>
-            </a:r>
-            <a:r>
-              <a:rPr lang="sq-AL" sz="3200" smtClean="0"/>
-              <a:t>M</a:t>
-            </a:r>
-            <a:r>
-              <a:rPr lang="sq-AL" sz="3200" smtClean="0"/>
-              <a:t>bretëreshat nuk duhet të qëndrojnë në hapësirën e lëvizjes së </a:t>
-            </a:r>
-            <a:r>
-              <a:rPr lang="sq-AL" sz="3200" smtClean="0"/>
-              <a:t>njëra-tjetrës</a:t>
-            </a:r>
-            <a:endParaRPr lang="sq-AL" sz="3200" smtClean="0"/>
-          </a:p>
-          <a:p>
-            <a:r>
-              <a:rPr lang="sq-AL" sz="3200" smtClean="0">
+              <a:rPr lang="sq-AL" sz="3200"/>
+              <a:t>: Mbretëreshat nuk duhet të qëndrojnë në hapësirën e lëvizjes së njëra-tjetrës</a:t>
+            </a:r>
+          </a:p>
+          <a:p>
+            <a:r>
+              <a:rPr lang="sq-AL" sz="3200">
                 <a:solidFill>
                   <a:srgbClr val="00B050"/>
                 </a:solidFill>
@@ -5855,14 +5688,9 @@
               <a:t>Zgjidhjet</a:t>
             </a:r>
             <a:r>
-              <a:rPr lang="sq-AL" sz="3200" smtClean="0"/>
-              <a:t>: 92 kombinime të </a:t>
-            </a:r>
-            <a:r>
-              <a:rPr lang="sq-AL" sz="3200" smtClean="0"/>
-              <a:t>mundshme</a:t>
-            </a:r>
-            <a:endParaRPr lang="sq-AL" sz="3200" smtClean="0"/>
+              <a:rPr lang="sq-AL" sz="3200"/>
+              <a:t>: 92 kombinime të mundshme</a:t>
+            </a:r>
           </a:p>
           <a:p>
             <a:endParaRPr lang="sq-AL"/>
@@ -5893,35 +5721,52 @@
           </a:prstGeom>
         </p:spPr>
       </p:pic>
+      <p:pic>
+        <p:nvPicPr>
+          <p:cNvPr id="3" name="Picture 10" descr="UP-logo.gif"/>
+          <p:cNvPicPr>
+            <a:picLocks noChangeAspect="1"/>
+          </p:cNvPicPr>
+          <p:nvPr/>
+        </p:nvPicPr>
+        <p:blipFill>
+          <a:blip r:embed="rId4"/>
+          <a:stretch>
+            <a:fillRect/>
+          </a:stretch>
+        </p:blipFill>
+        <p:spPr>
+          <a:xfrm>
+            <a:off x="-47625" y="76200"/>
+            <a:ext cx="1456439" cy="971271"/>
+          </a:xfrm>
+          <a:prstGeom prst="rect">
+            <a:avLst/>
+          </a:prstGeom>
+        </p:spPr>
+      </p:pic>
     </p:spTree>
     <p:extLst>
       <p:ext uri="{BB962C8B-B14F-4D97-AF65-F5344CB8AC3E}">
-        <p14:creationId xmlns:p14="http://schemas.microsoft.com/office/powerpoint/2010/main" xmlns="" val="1654255301"/>
+        <p14:creationId xmlns:p14="http://schemas.microsoft.com/office/powerpoint/2010/main" val="1654255301"/>
       </p:ext>
     </p:extLst>
   </p:cSld>
   <p:clrMapOvr>
     <a:masterClrMapping/>
   </p:clrMapOvr>
-  <mc:AlternateContent xmlns:mc="http://schemas.openxmlformats.org/markup-compatibility/2006">
-    <mc:Choice xmlns:p14="http://schemas.microsoft.com/office/powerpoint/2010/main" xmlns="" Requires="p14">
+  <mc:AlternateContent xmlns:mc="http://schemas.openxmlformats.org/markup-compatibility/2006" xmlns:p14="http://schemas.microsoft.com/office/powerpoint/2010/main">
+    <mc:Choice Requires="p14">
       <p:transition spd="med" p14:dur="700">
         <p:fade/>
       </p:transition>
     </mc:Choice>
-    <mc:Fallback>
+    <mc:Fallback xmlns="">
       <p:transition spd="med">
         <p:fade/>
       </p:transition>
     </mc:Fallback>
   </mc:AlternateContent>
-  <p:timing>
-    <p:tnLst>
-      <p:par>
-        <p:cTn id="1" dur="indefinite" restart="never" nodeType="tmRoot"/>
-      </p:par>
-    </p:tnLst>
-  </p:timing>
 </p:sld>
 </file>
 
@@ -6075,18 +5920,9 @@
           <a:lstStyle/>
           <a:p>
             <a:r>
-              <a:rPr lang="sq-AL" sz="3600" smtClean="0"/>
-              <a:t>Modeli</a:t>
-            </a:r>
-            <a:r>
-              <a:rPr lang="sq-AL" sz="3600" smtClean="0"/>
-              <a:t> </a:t>
-            </a:r>
-            <a:r>
-              <a:rPr lang="sq-AL" sz="3600" smtClean="0"/>
-              <a:t>matematik</a:t>
-            </a:r>
-            <a:endParaRPr lang="sq-AL" sz="3600"/>
+              <a:rPr lang="sq-AL" sz="3600"/>
+              <a:t>Modeli matematik</a:t>
+            </a:r>
           </a:p>
         </p:txBody>
       </p:sp>
@@ -6104,9 +5940,82 @@
         </p:xfrm>
         <a:graphic>
           <a:graphicData uri="http://schemas.openxmlformats.org/presentationml/2006/ole">
-            <p:oleObj spid="_x0000_s1026" name="Equation" r:id="rId5" imgW="2374560" imgH="419040" progId="Equation.DSMT4">
-              <p:embed/>
-            </p:oleObj>
+            <mc:AlternateContent xmlns:mc="http://schemas.openxmlformats.org/markup-compatibility/2006">
+              <mc:Choice xmlns:v="urn:schemas-microsoft-com:vml" Requires="v">
+                <p:oleObj spid="_x0000_s22529" name="Equation" r:id="rId5" imgW="2374560" imgH="419040" progId="Equation.DSMT4">
+                  <p:embed/>
+                </p:oleObj>
+              </mc:Choice>
+              <mc:Fallback>
+                <p:oleObj name="Equation" r:id="rId5" imgW="2374560" imgH="419040" progId="Equation.DSMT4">
+                  <p:embed/>
+                  <p:pic>
+                    <p:nvPicPr>
+                      <p:cNvPr id="1026" name="Object 2"/>
+                      <p:cNvPicPr>
+                        <a:picLocks noChangeAspect="1" noChangeArrowheads="1"/>
+                      </p:cNvPicPr>
+                      <p:nvPr/>
+                    </p:nvPicPr>
+                    <p:blipFill>
+                      <a:blip r:embed="rId6">
+                        <a:extLst>
+                          <a:ext uri="{28A0092B-C50C-407E-A947-70E740481C1C}">
+                            <a14:useLocalDpi xmlns:a14="http://schemas.microsoft.com/office/drawing/2010/main" val="0"/>
+                          </a:ext>
+                        </a:extLst>
+                      </a:blip>
+                      <a:srcRect/>
+                      <a:stretch>
+                        <a:fillRect/>
+                      </a:stretch>
+                    </p:blipFill>
+                    <p:spPr bwMode="auto">
+                      <a:xfrm>
+                        <a:off x="3409950" y="2392362"/>
+                        <a:ext cx="5340350" cy="1036638"/>
+                      </a:xfrm>
+                      <a:prstGeom prst="rect">
+                        <a:avLst/>
+                      </a:prstGeom>
+                      <a:noFill/>
+                      <a:ln>
+                        <a:noFill/>
+                      </a:ln>
+                      <a:effectLst/>
+                      <a:extLst>
+                        <a:ext uri="{909E8E84-426E-40DD-AFC4-6F175D3DCCD1}">
+                          <a14:hiddenFill xmlns:a14="http://schemas.microsoft.com/office/drawing/2010/main">
+                            <a:solidFill>
+                              <a:schemeClr val="accent1"/>
+                            </a:solidFill>
+                          </a14:hiddenFill>
+                        </a:ext>
+                        <a:ext uri="{91240B29-F687-4F45-9708-019B960494DF}">
+                          <a14:hiddenLine xmlns:a14="http://schemas.microsoft.com/office/drawing/2010/main" w="9525">
+                            <a:solidFill>
+                              <a:schemeClr val="tx1"/>
+                            </a:solidFill>
+                            <a:miter lim="800000"/>
+                            <a:headEnd/>
+                            <a:tailEnd/>
+                          </a14:hiddenLine>
+                        </a:ext>
+                        <a:ext uri="{AF507438-7753-43E0-B8FC-AC1667EBCBE1}">
+                          <a14:hiddenEffects xmlns:a14="http://schemas.microsoft.com/office/drawing/2010/main">
+                            <a:effectLst>
+                              <a:outerShdw dist="35921" dir="2700000" algn="ctr" rotWithShape="0">
+                                <a:schemeClr val="bg2"/>
+                              </a:outerShdw>
+                            </a:effectLst>
+                          </a14:hiddenEffects>
+                        </a:ext>
+                      </a:extLst>
+                    </p:spPr>
+                  </p:pic>
+                </p:oleObj>
+              </mc:Fallback>
+            </mc:AlternateContent>
           </a:graphicData>
         </a:graphic>
       </p:graphicFrame>
@@ -6133,18 +6042,9 @@
           <a:lstStyle/>
           <a:p>
             <a:r>
-              <a:rPr lang="sq-AL" smtClean="0"/>
-              <a:t>kombinime</a:t>
-            </a:r>
-            <a:r>
-              <a:rPr lang="sq-AL" smtClean="0"/>
-              <a:t> të </a:t>
-            </a:r>
-            <a:r>
-              <a:rPr lang="sq-AL" smtClean="0"/>
-              <a:t>mundshme</a:t>
-            </a:r>
-            <a:endParaRPr lang="sq-AL"/>
+              <a:rPr lang="sq-AL"/>
+              <a:t>kombinime të mundshme</a:t>
+            </a:r>
           </a:p>
         </p:txBody>
       </p:sp>
@@ -6172,34 +6072,16 @@
           <a:p>
             <a:pPr algn="ctr"/>
             <a:r>
-              <a:rPr lang="sq-AL" smtClean="0"/>
-              <a:t>Thjeshtim</a:t>
-            </a:r>
-            <a:r>
-              <a:rPr lang="sq-AL" smtClean="0"/>
-              <a:t> i problemit - kombinime të pozicioneve që nuk i takojnë të njëjtit rresht </a:t>
-            </a:r>
-            <a:endParaRPr lang="sq-AL" smtClean="0"/>
+              <a:rPr lang="sq-AL"/>
+              <a:t>Thjeshtim i problemit - kombinime të pozicioneve që nuk i takojnë të njëjtit rresht </a:t>
+            </a:r>
           </a:p>
           <a:p>
             <a:pPr algn="ctr"/>
             <a:r>
-              <a:rPr lang="sq-AL" smtClean="0"/>
-              <a:t>(</a:t>
-            </a:r>
-            <a:r>
-              <a:rPr lang="sq-AL" smtClean="0"/>
-              <a:t>ose </a:t>
-            </a:r>
-            <a:r>
-              <a:rPr lang="sq-AL" smtClean="0"/>
-              <a:t>kolonë</a:t>
-            </a:r>
-            <a:r>
-              <a:rPr lang="sq-AL" smtClean="0"/>
-              <a:t>): </a:t>
-            </a:r>
-            <a:endParaRPr lang="sq-AL"/>
+              <a:rPr lang="sq-AL"/>
+              <a:t>(ose kolonë): </a:t>
+            </a:r>
           </a:p>
         </p:txBody>
       </p:sp>
@@ -6217,9 +6099,82 @@
         </p:xfrm>
         <a:graphic>
           <a:graphicData uri="http://schemas.openxmlformats.org/presentationml/2006/ole">
-            <p:oleObj spid="_x0000_s1027" name="Equation" r:id="rId6" imgW="1028520" imgH="228600" progId="Equation.DSMT4">
-              <p:embed/>
-            </p:oleObj>
+            <mc:AlternateContent xmlns:mc="http://schemas.openxmlformats.org/markup-compatibility/2006">
+              <mc:Choice xmlns:v="urn:schemas-microsoft-com:vml" Requires="v">
+                <p:oleObj spid="_x0000_s22530" name="Equation" r:id="rId7" imgW="1028520" imgH="228600" progId="Equation.DSMT4">
+                  <p:embed/>
+                </p:oleObj>
+              </mc:Choice>
+              <mc:Fallback>
+                <p:oleObj name="Equation" r:id="rId7" imgW="1028520" imgH="228600" progId="Equation.DSMT4">
+                  <p:embed/>
+                  <p:pic>
+                    <p:nvPicPr>
+                      <p:cNvPr id="1027" name="Object 3"/>
+                      <p:cNvPicPr>
+                        <a:picLocks noChangeAspect="1" noChangeArrowheads="1"/>
+                      </p:cNvPicPr>
+                      <p:nvPr/>
+                    </p:nvPicPr>
+                    <p:blipFill>
+                      <a:blip r:embed="rId8">
+                        <a:extLst>
+                          <a:ext uri="{28A0092B-C50C-407E-A947-70E740481C1C}">
+                            <a14:useLocalDpi xmlns:a14="http://schemas.microsoft.com/office/drawing/2010/main" val="0"/>
+                          </a:ext>
+                        </a:extLst>
+                      </a:blip>
+                      <a:srcRect/>
+                      <a:stretch>
+                        <a:fillRect/>
+                      </a:stretch>
+                    </p:blipFill>
+                    <p:spPr bwMode="auto">
+                      <a:xfrm>
+                        <a:off x="1441450" y="5624514"/>
+                        <a:ext cx="2402961" cy="611186"/>
+                      </a:xfrm>
+                      <a:prstGeom prst="rect">
+                        <a:avLst/>
+                      </a:prstGeom>
+                      <a:noFill/>
+                      <a:ln>
+                        <a:noFill/>
+                      </a:ln>
+                      <a:effectLst/>
+                      <a:extLst>
+                        <a:ext uri="{909E8E84-426E-40DD-AFC4-6F175D3DCCD1}">
+                          <a14:hiddenFill xmlns:a14="http://schemas.microsoft.com/office/drawing/2010/main">
+                            <a:solidFill>
+                              <a:schemeClr val="accent1"/>
+                            </a:solidFill>
+                          </a14:hiddenFill>
+                        </a:ext>
+                        <a:ext uri="{91240B29-F687-4F45-9708-019B960494DF}">
+                          <a14:hiddenLine xmlns:a14="http://schemas.microsoft.com/office/drawing/2010/main" w="9525">
+                            <a:solidFill>
+                              <a:schemeClr val="tx1"/>
+                            </a:solidFill>
+                            <a:miter lim="800000"/>
+                            <a:headEnd/>
+                            <a:tailEnd/>
+                          </a14:hiddenLine>
+                        </a:ext>
+                        <a:ext uri="{AF507438-7753-43E0-B8FC-AC1667EBCBE1}">
+                          <a14:hiddenEffects xmlns:a14="http://schemas.microsoft.com/office/drawing/2010/main">
+                            <a:effectLst>
+                              <a:outerShdw dist="35921" dir="2700000" algn="ctr" rotWithShape="0">
+                                <a:schemeClr val="bg2"/>
+                              </a:outerShdw>
+                            </a:effectLst>
+                          </a14:hiddenEffects>
+                        </a:ext>
+                      </a:extLst>
+                    </p:spPr>
+                  </p:pic>
+                </p:oleObj>
+              </mc:Fallback>
+            </mc:AlternateContent>
           </a:graphicData>
         </a:graphic>
       </p:graphicFrame>
@@ -6246,10 +6201,9 @@
           <a:lstStyle/>
           <a:p>
             <a:r>
-              <a:rPr lang="sq-AL" sz="2000" smtClean="0"/>
+              <a:rPr lang="sq-AL" sz="2000"/>
               <a:t>kombinime</a:t>
             </a:r>
-            <a:endParaRPr lang="sq-AL" sz="2000"/>
           </a:p>
         </p:txBody>
       </p:sp>
@@ -6323,30 +6277,16 @@
           <a:p>
             <a:pPr algn="ctr"/>
             <a:r>
-              <a:rPr lang="sq-AL" smtClean="0"/>
-              <a:t>Kombinime</a:t>
-            </a:r>
-            <a:r>
-              <a:rPr lang="sq-AL" smtClean="0"/>
-              <a:t> të pozicioneve që nuk i takojnë të njëjtit rresht </a:t>
-            </a:r>
-            <a:endParaRPr lang="sq-AL" smtClean="0"/>
+              <a:rPr lang="sq-AL"/>
+              <a:t>Kombinime të pozicioneve që nuk i takojnë të njëjtit rresht </a:t>
+            </a:r>
           </a:p>
           <a:p>
             <a:pPr algn="ctr"/>
             <a:r>
-              <a:rPr lang="sq-AL" smtClean="0"/>
-              <a:t>as </a:t>
-            </a:r>
-            <a:r>
-              <a:rPr lang="sq-AL" smtClean="0"/>
-              <a:t>kolonë</a:t>
-            </a:r>
-            <a:r>
-              <a:rPr lang="sq-AL" smtClean="0"/>
-              <a:t>: </a:t>
-            </a:r>
-            <a:endParaRPr lang="sq-AL"/>
+              <a:rPr lang="sq-AL"/>
+              <a:t>as kolonë: </a:t>
+            </a:r>
           </a:p>
         </p:txBody>
       </p:sp>
@@ -6364,9 +6304,82 @@
         </p:xfrm>
         <a:graphic>
           <a:graphicData uri="http://schemas.openxmlformats.org/presentationml/2006/ole">
-            <p:oleObj spid="_x0000_s1028" name="Equation" r:id="rId7" imgW="736560" imgH="203040" progId="Equation.DSMT4">
-              <p:embed/>
-            </p:oleObj>
+            <mc:AlternateContent xmlns:mc="http://schemas.openxmlformats.org/markup-compatibility/2006">
+              <mc:Choice xmlns:v="urn:schemas-microsoft-com:vml" Requires="v">
+                <p:oleObj spid="_x0000_s22531" name="Equation" r:id="rId9" imgW="736560" imgH="203040" progId="Equation.DSMT4">
+                  <p:embed/>
+                </p:oleObj>
+              </mc:Choice>
+              <mc:Fallback>
+                <p:oleObj name="Equation" r:id="rId9" imgW="736560" imgH="203040" progId="Equation.DSMT4">
+                  <p:embed/>
+                  <p:pic>
+                    <p:nvPicPr>
+                      <p:cNvPr id="16" name="Object 3"/>
+                      <p:cNvPicPr>
+                        <a:picLocks noChangeAspect="1" noChangeArrowheads="1"/>
+                      </p:cNvPicPr>
+                      <p:nvPr/>
+                    </p:nvPicPr>
+                    <p:blipFill>
+                      <a:blip r:embed="rId10">
+                        <a:extLst>
+                          <a:ext uri="{28A0092B-C50C-407E-A947-70E740481C1C}">
+                            <a14:useLocalDpi xmlns:a14="http://schemas.microsoft.com/office/drawing/2010/main" val="0"/>
+                          </a:ext>
+                        </a:extLst>
+                      </a:blip>
+                      <a:srcRect/>
+                      <a:stretch>
+                        <a:fillRect/>
+                      </a:stretch>
+                    </p:blipFill>
+                    <p:spPr bwMode="auto">
+                      <a:xfrm>
+                        <a:off x="7386638" y="5645150"/>
+                        <a:ext cx="1681162" cy="534988"/>
+                      </a:xfrm>
+                      <a:prstGeom prst="rect">
+                        <a:avLst/>
+                      </a:prstGeom>
+                      <a:noFill/>
+                      <a:ln>
+                        <a:noFill/>
+                      </a:ln>
+                      <a:effectLst/>
+                      <a:extLst>
+                        <a:ext uri="{909E8E84-426E-40DD-AFC4-6F175D3DCCD1}">
+                          <a14:hiddenFill xmlns:a14="http://schemas.microsoft.com/office/drawing/2010/main">
+                            <a:solidFill>
+                              <a:schemeClr val="accent1"/>
+                            </a:solidFill>
+                          </a14:hiddenFill>
+                        </a:ext>
+                        <a:ext uri="{91240B29-F687-4F45-9708-019B960494DF}">
+                          <a14:hiddenLine xmlns:a14="http://schemas.microsoft.com/office/drawing/2010/main" w="9525">
+                            <a:solidFill>
+                              <a:schemeClr val="tx1"/>
+                            </a:solidFill>
+                            <a:miter lim="800000"/>
+                            <a:headEnd/>
+                            <a:tailEnd/>
+                          </a14:hiddenLine>
+                        </a:ext>
+                        <a:ext uri="{AF507438-7753-43E0-B8FC-AC1667EBCBE1}">
+                          <a14:hiddenEffects xmlns:a14="http://schemas.microsoft.com/office/drawing/2010/main">
+                            <a:effectLst>
+                              <a:outerShdw dist="35921" dir="2700000" algn="ctr" rotWithShape="0">
+                                <a:schemeClr val="bg2"/>
+                              </a:outerShdw>
+                            </a:effectLst>
+                          </a14:hiddenEffects>
+                        </a:ext>
+                      </a:extLst>
+                    </p:spPr>
+                  </p:pic>
+                </p:oleObj>
+              </mc:Fallback>
+            </mc:AlternateContent>
           </a:graphicData>
         </a:graphic>
       </p:graphicFrame>
@@ -6393,10 +6406,9 @@
           <a:lstStyle/>
           <a:p>
             <a:r>
-              <a:rPr lang="sq-AL" sz="2000" smtClean="0"/>
+              <a:rPr lang="sq-AL" sz="2000"/>
               <a:t>kombinime</a:t>
             </a:r>
-            <a:endParaRPr lang="sq-AL" sz="2000"/>
           </a:p>
         </p:txBody>
       </p:sp>
@@ -6409,7 +6421,7 @@
           <p:nvPr/>
         </p:nvPicPr>
         <p:blipFill>
-          <a:blip r:embed="rId8" cstate="print"/>
+          <a:blip r:embed="rId11" cstate="print"/>
           <a:stretch>
             <a:fillRect/>
           </a:stretch>
@@ -6424,35 +6436,52 @@
           </a:prstGeom>
         </p:spPr>
       </p:pic>
+      <p:pic>
+        <p:nvPicPr>
+          <p:cNvPr id="3" name="Picture 10" descr="UP-logo.gif"/>
+          <p:cNvPicPr>
+            <a:picLocks noChangeAspect="1"/>
+          </p:cNvPicPr>
+          <p:nvPr/>
+        </p:nvPicPr>
+        <p:blipFill>
+          <a:blip r:embed="rId12"/>
+          <a:stretch>
+            <a:fillRect/>
+          </a:stretch>
+        </p:blipFill>
+        <p:spPr>
+          <a:xfrm>
+            <a:off x="-47625" y="76200"/>
+            <a:ext cx="1456439" cy="971271"/>
+          </a:xfrm>
+          <a:prstGeom prst="rect">
+            <a:avLst/>
+          </a:prstGeom>
+        </p:spPr>
+      </p:pic>
     </p:spTree>
     <p:extLst>
       <p:ext uri="{BB962C8B-B14F-4D97-AF65-F5344CB8AC3E}">
-        <p14:creationId xmlns:p14="http://schemas.microsoft.com/office/powerpoint/2010/main" xmlns="" val="1654255301"/>
+        <p14:creationId xmlns:p14="http://schemas.microsoft.com/office/powerpoint/2010/main" val="1654255301"/>
       </p:ext>
     </p:extLst>
   </p:cSld>
   <p:clrMapOvr>
     <a:masterClrMapping/>
   </p:clrMapOvr>
-  <mc:AlternateContent xmlns:mc="http://schemas.openxmlformats.org/markup-compatibility/2006">
-    <mc:Choice xmlns:p14="http://schemas.microsoft.com/office/powerpoint/2010/main" xmlns="" Requires="p14">
+  <mc:AlternateContent xmlns:mc="http://schemas.openxmlformats.org/markup-compatibility/2006" xmlns:p14="http://schemas.microsoft.com/office/powerpoint/2010/main">
+    <mc:Choice Requires="p14">
       <p:transition spd="med" p14:dur="700">
         <p:fade/>
       </p:transition>
     </mc:Choice>
-    <mc:Fallback>
+    <mc:Fallback xmlns="">
       <p:transition spd="med">
         <p:fade/>
       </p:transition>
     </mc:Fallback>
   </mc:AlternateContent>
-  <p:timing>
-    <p:tnLst>
-      <p:par>
-        <p:cTn id="1" dur="indefinite" restart="never" nodeType="tmRoot"/>
-      </p:par>
-    </p:tnLst>
-  </p:timing>
 </p:sld>
 </file>
 
@@ -6491,18 +6520,9 @@
           <a:lstStyle/>
           <a:p>
             <a:r>
-              <a:rPr lang="sq-AL" sz="3600" smtClean="0"/>
-              <a:t>Zgjidhja</a:t>
-            </a:r>
-            <a:r>
-              <a:rPr lang="sq-AL" sz="3600" smtClean="0"/>
-              <a:t> kompjuterike- Backtracking </a:t>
-            </a:r>
-            <a:r>
-              <a:rPr lang="sq-AL" sz="3600" smtClean="0"/>
-              <a:t>Algoritmi</a:t>
-            </a:r>
-            <a:endParaRPr lang="sq-AL" sz="3600"/>
+              <a:rPr lang="sq-AL" sz="3600"/>
+              <a:t>Zgjidhja kompjuterike- Backtracking Algoritmi</a:t>
+            </a:r>
           </a:p>
         </p:txBody>
       </p:sp>
@@ -6527,130 +6547,42 @@
           <a:lstStyle/>
           <a:p>
             <a:r>
-              <a:rPr lang="sq-AL" sz="2800" smtClean="0"/>
-              <a:t>Provon</a:t>
-            </a:r>
-            <a:r>
-              <a:rPr lang="sq-AL" sz="2800" smtClean="0"/>
-              <a:t> zgjidhjet e mundshme në mënyrë </a:t>
-            </a:r>
-            <a:r>
-              <a:rPr lang="sq-AL" sz="2800" smtClean="0"/>
-              <a:t>rekursive</a:t>
-            </a:r>
-            <a:endParaRPr lang="sq-AL" sz="2800" smtClean="0"/>
-          </a:p>
-          <a:p>
-            <a:r>
-              <a:rPr lang="sq-AL" sz="2800" smtClean="0"/>
-              <a:t>Nëse pozicioni i caktuar plotëson </a:t>
-            </a:r>
-            <a:r>
-              <a:rPr lang="sq-AL" sz="2800" smtClean="0"/>
-              <a:t>kushtet</a:t>
-            </a:r>
-            <a:r>
-              <a:rPr lang="sq-AL" sz="2800" smtClean="0"/>
-              <a:t>, bëhet pjesë e </a:t>
-            </a:r>
-            <a:r>
-              <a:rPr lang="sq-AL" sz="2800" smtClean="0"/>
-              <a:t>zgjidhjes</a:t>
-            </a:r>
-            <a:endParaRPr lang="sq-AL" sz="2800" smtClean="0"/>
-          </a:p>
-          <a:p>
-            <a:r>
-              <a:rPr lang="sq-AL" sz="2800" smtClean="0"/>
-              <a:t>Nëse kushtet nuk </a:t>
-            </a:r>
-            <a:r>
-              <a:rPr lang="sq-AL" sz="2800" smtClean="0"/>
-              <a:t>plotësohen</a:t>
-            </a:r>
-            <a:r>
-              <a:rPr lang="sq-AL" sz="2800" smtClean="0"/>
-              <a:t>, provojmë opsionet </a:t>
-            </a:r>
-            <a:r>
-              <a:rPr lang="sq-AL" sz="2800" smtClean="0"/>
-              <a:t>tjera</a:t>
-            </a:r>
-            <a:r>
-              <a:rPr lang="sq-AL" sz="2800" smtClean="0"/>
-              <a:t>, përndryshe kthehemi një hap mbrapa </a:t>
-            </a:r>
-            <a:r>
-              <a:rPr lang="sq-AL" sz="2800" smtClean="0">
+              <a:rPr lang="sq-AL" sz="2800"/>
+              <a:t>Provon zgjidhjet e mundshme në mënyrë rekursive</a:t>
+            </a:r>
+          </a:p>
+          <a:p>
+            <a:r>
+              <a:rPr lang="sq-AL" sz="2800"/>
+              <a:t>Nëse pozicioni i caktuar plotëson kushtet, bëhet pjesë e zgjidhjes</a:t>
+            </a:r>
+          </a:p>
+          <a:p>
+            <a:r>
+              <a:rPr lang="sq-AL" sz="2800"/>
+              <a:t>Nëse kushtet nuk plotësohen, provojmë opsionet tjera, përndryshe kthehemi një hap mbrapa </a:t>
+            </a:r>
+            <a:r>
+              <a:rPr lang="sq-AL" sz="2800">
                 <a:solidFill>
                   <a:srgbClr val="C00000"/>
                 </a:solidFill>
               </a:rPr>
-              <a:t>(</a:t>
-            </a:r>
-            <a:r>
-              <a:rPr lang="sq-AL" sz="2800" smtClean="0">
-                <a:solidFill>
-                  <a:srgbClr val="C00000"/>
-                </a:solidFill>
-              </a:rPr>
-              <a:t>nga edhe vjen </a:t>
-            </a:r>
-            <a:r>
-              <a:rPr lang="sq-AL" sz="2800" smtClean="0">
-                <a:solidFill>
-                  <a:srgbClr val="C00000"/>
-                </a:solidFill>
-              </a:rPr>
-              <a:t>emërtimi)</a:t>
-            </a:r>
-            <a:endParaRPr lang="sq-AL" sz="2800" smtClean="0">
-              <a:solidFill>
-                <a:srgbClr val="C00000"/>
-              </a:solidFill>
-            </a:endParaRPr>
-          </a:p>
-          <a:p>
-            <a:r>
-              <a:rPr lang="sq-AL" sz="2800" smtClean="0">
+              <a:t>(nga edhe vjen emërtimi)</a:t>
+            </a:r>
+          </a:p>
+          <a:p>
+            <a:r>
+              <a:rPr lang="sq-AL" sz="2800">
                 <a:solidFill>
                   <a:srgbClr val="00B050"/>
                 </a:solidFill>
               </a:rPr>
-              <a:t>Tentimet për të gjetur </a:t>
-            </a:r>
-            <a:r>
-              <a:rPr lang="sq-AL" sz="2800" smtClean="0">
-                <a:solidFill>
-                  <a:srgbClr val="00B050"/>
-                </a:solidFill>
-              </a:rPr>
-              <a:t>zgjidhjen</a:t>
-            </a:r>
-            <a:r>
-              <a:rPr lang="sq-AL" sz="2800" smtClean="0">
-                <a:solidFill>
-                  <a:srgbClr val="00B050"/>
-                </a:solidFill>
-              </a:rPr>
-              <a:t>: </a:t>
-            </a:r>
-            <a:r>
-              <a:rPr lang="sq-AL" sz="2800" smtClean="0">
-                <a:solidFill>
-                  <a:srgbClr val="00B050"/>
-                </a:solidFill>
-              </a:rPr>
-              <a:t>15,720</a:t>
-            </a:r>
-            <a:endParaRPr lang="sq-AL" sz="2800" smtClean="0">
-              <a:solidFill>
-                <a:srgbClr val="00B050"/>
-              </a:solidFill>
-            </a:endParaRPr>
-          </a:p>
-          <a:p>
-            <a:endParaRPr lang="sq-AL" sz="3200" smtClean="0">
+              <a:t>Tentimet për të gjetur zgjidhjen: 15,720</a:t>
+            </a:r>
+          </a:p>
+          <a:p>
+            <a:endParaRPr lang="sq-AL" sz="3200">
               <a:solidFill>
                 <a:srgbClr val="C00000"/>
               </a:solidFill>
@@ -6709,35 +6641,52 @@
           </a:prstGeom>
         </p:spPr>
       </p:pic>
+      <p:pic>
+        <p:nvPicPr>
+          <p:cNvPr id="3" name="Picture 10" descr="UP-logo.gif"/>
+          <p:cNvPicPr>
+            <a:picLocks noChangeAspect="1"/>
+          </p:cNvPicPr>
+          <p:nvPr/>
+        </p:nvPicPr>
+        <p:blipFill>
+          <a:blip r:embed="rId5"/>
+          <a:stretch>
+            <a:fillRect/>
+          </a:stretch>
+        </p:blipFill>
+        <p:spPr>
+          <a:xfrm>
+            <a:off x="-47625" y="76200"/>
+            <a:ext cx="1456439" cy="971271"/>
+          </a:xfrm>
+          <a:prstGeom prst="rect">
+            <a:avLst/>
+          </a:prstGeom>
+        </p:spPr>
+      </p:pic>
     </p:spTree>
     <p:extLst>
       <p:ext uri="{BB962C8B-B14F-4D97-AF65-F5344CB8AC3E}">
-        <p14:creationId xmlns:p14="http://schemas.microsoft.com/office/powerpoint/2010/main" xmlns="" val="1654255301"/>
+        <p14:creationId xmlns:p14="http://schemas.microsoft.com/office/powerpoint/2010/main" val="1654255301"/>
       </p:ext>
     </p:extLst>
   </p:cSld>
   <p:clrMapOvr>
     <a:masterClrMapping/>
   </p:clrMapOvr>
-  <mc:AlternateContent xmlns:mc="http://schemas.openxmlformats.org/markup-compatibility/2006">
-    <mc:Choice xmlns:p14="http://schemas.microsoft.com/office/powerpoint/2010/main" xmlns="" Requires="p14">
+  <mc:AlternateContent xmlns:mc="http://schemas.openxmlformats.org/markup-compatibility/2006" xmlns:p14="http://schemas.microsoft.com/office/powerpoint/2010/main">
+    <mc:Choice Requires="p14">
       <p:transition spd="med" p14:dur="700">
         <p:fade/>
       </p:transition>
     </mc:Choice>
-    <mc:Fallback>
+    <mc:Fallback xmlns="">
       <p:transition spd="med">
         <p:fade/>
       </p:transition>
     </mc:Fallback>
   </mc:AlternateContent>
-  <p:timing>
-    <p:tnLst>
-      <p:par>
-        <p:cTn id="1" dur="indefinite" restart="never" nodeType="tmRoot"/>
-      </p:par>
-    </p:tnLst>
-  </p:timing>
 </p:sld>
 </file>
 
@@ -6776,7 +6725,7 @@
           <a:lstStyle/>
           <a:p>
             <a:r>
-              <a:rPr lang="en-US" sz="3600" dirty="0" err="1" smtClean="0"/>
+              <a:rPr lang="en-US" sz="3600" dirty="0" err="1"/>
               <a:t>Pseudokodi</a:t>
             </a:r>
             <a:endParaRPr lang="en-US" sz="3600" dirty="0"/>
@@ -6809,224 +6758,101 @@
               <a:buNone/>
             </a:pPr>
             <a:r>
-              <a:rPr lang="en-US" dirty="0" smtClean="0">
+              <a:rPr lang="en-US" dirty="0">
                 <a:latin typeface="Moire Light" pitchFamily="2" charset="0"/>
               </a:rPr>
               <a:t>Pick a starting point. </a:t>
             </a:r>
-            <a:endParaRPr lang="en-US" dirty="0" smtClean="0">
-              <a:latin typeface="Moire Light" pitchFamily="2" charset="0"/>
-            </a:endParaRPr>
           </a:p>
           <a:p>
             <a:pPr>
               <a:buNone/>
             </a:pPr>
             <a:r>
-              <a:rPr lang="en-US" dirty="0" smtClean="0">
+              <a:rPr lang="en-US" dirty="0">
                 <a:latin typeface="Moire Light" pitchFamily="2" charset="0"/>
               </a:rPr>
-              <a:t>w</a:t>
-            </a:r>
-            <a:r>
-              <a:rPr lang="en-US" dirty="0" smtClean="0">
+              <a:t>while(Problem is not solved) </a:t>
+            </a:r>
+          </a:p>
+          <a:p>
+            <a:pPr>
+              <a:buNone/>
+            </a:pPr>
+            <a:r>
+              <a:rPr lang="en-US" dirty="0">
                 <a:latin typeface="Moire Light" pitchFamily="2" charset="0"/>
               </a:rPr>
-              <a:t>hile(Problem </a:t>
-            </a:r>
-            <a:r>
-              <a:rPr lang="en-US" dirty="0" smtClean="0">
+              <a:t>	For each path from the starting point. </a:t>
+            </a:r>
+          </a:p>
+          <a:p>
+            <a:pPr>
+              <a:buNone/>
+            </a:pPr>
+            <a:r>
+              <a:rPr lang="en-US" dirty="0">
                 <a:latin typeface="Moire Light" pitchFamily="2" charset="0"/>
               </a:rPr>
-              <a:t>is not solved) </a:t>
-            </a:r>
-            <a:endParaRPr lang="en-US" dirty="0" smtClean="0">
-              <a:latin typeface="Moire Light" pitchFamily="2" charset="0"/>
-            </a:endParaRPr>
+              <a:t>		check if selected path is safe, </a:t>
+            </a:r>
           </a:p>
           <a:p>
             <a:pPr>
               <a:buNone/>
             </a:pPr>
             <a:r>
-              <a:rPr lang="en-US" dirty="0" smtClean="0">
+              <a:rPr lang="en-US" dirty="0">
                 <a:latin typeface="Moire Light" pitchFamily="2" charset="0"/>
               </a:rPr>
-              <a:t>	For </a:t>
-            </a:r>
-            <a:r>
-              <a:rPr lang="en-US" dirty="0" smtClean="0">
+              <a:t>			if yes select it and make recursive call to rest of the problem </a:t>
+            </a:r>
+          </a:p>
+          <a:p>
+            <a:pPr>
+              <a:buNone/>
+            </a:pPr>
+            <a:r>
+              <a:rPr lang="en-US" dirty="0">
                 <a:latin typeface="Moire Light" pitchFamily="2" charset="0"/>
               </a:rPr>
-              <a:t>each path from the starting point. </a:t>
-            </a:r>
-            <a:endParaRPr lang="en-US" dirty="0" smtClean="0">
-              <a:latin typeface="Moire Light" pitchFamily="2" charset="0"/>
-            </a:endParaRPr>
+              <a:t>				If recursive calls returns true, then return true.</a:t>
+            </a:r>
           </a:p>
           <a:p>
             <a:pPr>
               <a:buNone/>
             </a:pPr>
             <a:r>
-              <a:rPr lang="en-US" dirty="0" smtClean="0">
+              <a:rPr lang="en-US" dirty="0">
                 <a:latin typeface="Moire Light" pitchFamily="2" charset="0"/>
               </a:rPr>
-              <a:t>	</a:t>
-            </a:r>
-            <a:r>
-              <a:rPr lang="en-US" dirty="0" smtClean="0">
+              <a:t>				 else undo the current move and return false. </a:t>
+            </a:r>
+          </a:p>
+          <a:p>
+            <a:pPr>
+              <a:buNone/>
+            </a:pPr>
+            <a:r>
+              <a:rPr lang="en-US" dirty="0">
                 <a:latin typeface="Moire Light" pitchFamily="2" charset="0"/>
               </a:rPr>
-              <a:t>	check </a:t>
-            </a:r>
-            <a:r>
-              <a:rPr lang="en-US" dirty="0" smtClean="0">
+              <a:t>	End For </a:t>
+            </a:r>
+          </a:p>
+          <a:p>
+            <a:pPr>
+              <a:buNone/>
+            </a:pPr>
+            <a:r>
+              <a:rPr lang="en-US" dirty="0">
                 <a:latin typeface="Moire Light" pitchFamily="2" charset="0"/>
               </a:rPr>
-              <a:t>if selected path is safe, </a:t>
-            </a:r>
-            <a:endParaRPr lang="en-US" dirty="0" smtClean="0">
-              <a:latin typeface="Moire Light" pitchFamily="2" charset="0"/>
-            </a:endParaRPr>
-          </a:p>
-          <a:p>
-            <a:pPr>
-              <a:buNone/>
-            </a:pPr>
-            <a:r>
-              <a:rPr lang="en-US" dirty="0" smtClean="0">
-                <a:latin typeface="Moire Light" pitchFamily="2" charset="0"/>
-              </a:rPr>
-              <a:t>	</a:t>
-            </a:r>
-            <a:r>
-              <a:rPr lang="en-US" dirty="0" smtClean="0">
-                <a:latin typeface="Moire Light" pitchFamily="2" charset="0"/>
-              </a:rPr>
-              <a:t>		if </a:t>
-            </a:r>
-            <a:r>
-              <a:rPr lang="en-US" dirty="0" smtClean="0">
-                <a:latin typeface="Moire Light" pitchFamily="2" charset="0"/>
-              </a:rPr>
-              <a:t>yes select it and make recursive call to rest of the problem </a:t>
-            </a:r>
-            <a:endParaRPr lang="en-US" dirty="0" smtClean="0">
-              <a:latin typeface="Moire Light" pitchFamily="2" charset="0"/>
-            </a:endParaRPr>
-          </a:p>
-          <a:p>
-            <a:pPr>
-              <a:buNone/>
-            </a:pPr>
-            <a:r>
-              <a:rPr lang="en-US" dirty="0" smtClean="0">
-                <a:latin typeface="Moire Light" pitchFamily="2" charset="0"/>
-              </a:rPr>
-              <a:t>	</a:t>
-            </a:r>
-            <a:r>
-              <a:rPr lang="en-US" dirty="0" smtClean="0">
-                <a:latin typeface="Moire Light" pitchFamily="2" charset="0"/>
-              </a:rPr>
-              <a:t>			If </a:t>
-            </a:r>
-            <a:r>
-              <a:rPr lang="en-US" dirty="0" smtClean="0">
-                <a:latin typeface="Moire Light" pitchFamily="2" charset="0"/>
-              </a:rPr>
-              <a:t>recursive calls returns true, then return true</a:t>
-            </a:r>
-            <a:r>
-              <a:rPr lang="en-US" dirty="0" smtClean="0">
-                <a:latin typeface="Moire Light" pitchFamily="2" charset="0"/>
-              </a:rPr>
-              <a:t>.</a:t>
-            </a:r>
-          </a:p>
-          <a:p>
-            <a:pPr>
-              <a:buNone/>
-            </a:pPr>
-            <a:r>
-              <a:rPr lang="en-US" dirty="0" smtClean="0">
-                <a:latin typeface="Moire Light" pitchFamily="2" charset="0"/>
-              </a:rPr>
-              <a:t>	</a:t>
-            </a:r>
-            <a:r>
-              <a:rPr lang="en-US" dirty="0" smtClean="0">
-                <a:latin typeface="Moire Light" pitchFamily="2" charset="0"/>
-              </a:rPr>
-              <a:t>			 </a:t>
-            </a:r>
-            <a:r>
-              <a:rPr lang="en-US" dirty="0" smtClean="0">
-                <a:latin typeface="Moire Light" pitchFamily="2" charset="0"/>
-              </a:rPr>
-              <a:t>else undo the current move and return false. </a:t>
-            </a:r>
-            <a:endParaRPr lang="en-US" dirty="0" smtClean="0">
-              <a:latin typeface="Moire Light" pitchFamily="2" charset="0"/>
-            </a:endParaRPr>
-          </a:p>
-          <a:p>
-            <a:pPr>
-              <a:buNone/>
-            </a:pPr>
-            <a:r>
-              <a:rPr lang="en-US" dirty="0" smtClean="0">
-                <a:latin typeface="Moire Light" pitchFamily="2" charset="0"/>
-              </a:rPr>
-              <a:t>	</a:t>
-            </a:r>
-            <a:r>
-              <a:rPr lang="en-US" dirty="0" smtClean="0">
-                <a:latin typeface="Moire Light" pitchFamily="2" charset="0"/>
-              </a:rPr>
-              <a:t>End </a:t>
-            </a:r>
-            <a:r>
-              <a:rPr lang="en-US" dirty="0" smtClean="0">
-                <a:latin typeface="Moire Light" pitchFamily="2" charset="0"/>
-              </a:rPr>
-              <a:t>For </a:t>
-            </a:r>
-            <a:endParaRPr lang="en-US" dirty="0" smtClean="0">
-              <a:latin typeface="Moire Light" pitchFamily="2" charset="0"/>
-            </a:endParaRPr>
-          </a:p>
-          <a:p>
-            <a:pPr>
-              <a:buNone/>
-            </a:pPr>
-            <a:r>
-              <a:rPr lang="en-US" dirty="0" smtClean="0">
-                <a:latin typeface="Moire Light" pitchFamily="2" charset="0"/>
-              </a:rPr>
-              <a:t>If </a:t>
-            </a:r>
-            <a:r>
-              <a:rPr lang="en-US" dirty="0" smtClean="0">
-                <a:latin typeface="Moire Light" pitchFamily="2" charset="0"/>
-              </a:rPr>
-              <a:t>none of the move w</a:t>
-            </a:r>
-            <a:r>
-              <a:rPr lang="en-US" dirty="0" smtClean="0">
-                <a:latin typeface="Moire Light" pitchFamily="2" charset="0"/>
-              </a:rPr>
-              <a:t>orks </a:t>
-            </a:r>
-            <a:r>
-              <a:rPr lang="en-US" dirty="0" smtClean="0">
-                <a:latin typeface="Moire Light" pitchFamily="2" charset="0"/>
-              </a:rPr>
-              <a:t>out, return false, NO SOLUTON. </a:t>
+              <a:t>If none of the move works out, return false, NO SOLUTON. </a:t>
             </a:r>
             <a:br>
-              <a:rPr lang="en-US" dirty="0" smtClean="0">
+              <a:rPr lang="en-US" dirty="0">
                 <a:latin typeface="Moire Light" pitchFamily="2" charset="0"/>
               </a:rPr>
             </a:br>
@@ -7060,35 +6886,52 @@
           </a:prstGeom>
         </p:spPr>
       </p:pic>
+      <p:pic>
+        <p:nvPicPr>
+          <p:cNvPr id="3" name="Picture 10" descr="UP-logo.gif"/>
+          <p:cNvPicPr>
+            <a:picLocks noChangeAspect="1"/>
+          </p:cNvPicPr>
+          <p:nvPr/>
+        </p:nvPicPr>
+        <p:blipFill>
+          <a:blip r:embed="rId4"/>
+          <a:stretch>
+            <a:fillRect/>
+          </a:stretch>
+        </p:blipFill>
+        <p:spPr>
+          <a:xfrm>
+            <a:off x="-47625" y="76200"/>
+            <a:ext cx="1456439" cy="971271"/>
+          </a:xfrm>
+          <a:prstGeom prst="rect">
+            <a:avLst/>
+          </a:prstGeom>
+        </p:spPr>
+      </p:pic>
     </p:spTree>
     <p:extLst>
       <p:ext uri="{BB962C8B-B14F-4D97-AF65-F5344CB8AC3E}">
-        <p14:creationId xmlns:p14="http://schemas.microsoft.com/office/powerpoint/2010/main" xmlns="" val="1654255301"/>
+        <p14:creationId xmlns:p14="http://schemas.microsoft.com/office/powerpoint/2010/main" val="1654255301"/>
       </p:ext>
     </p:extLst>
   </p:cSld>
   <p:clrMapOvr>
     <a:masterClrMapping/>
   </p:clrMapOvr>
-  <mc:AlternateContent xmlns:mc="http://schemas.openxmlformats.org/markup-compatibility/2006">
-    <mc:Choice xmlns:p14="http://schemas.microsoft.com/office/powerpoint/2010/main" xmlns="" Requires="p14">
+  <mc:AlternateContent xmlns:mc="http://schemas.openxmlformats.org/markup-compatibility/2006" xmlns:p14="http://schemas.microsoft.com/office/powerpoint/2010/main">
+    <mc:Choice Requires="p14">
       <p:transition spd="med" p14:dur="700">
         <p:fade/>
       </p:transition>
     </mc:Choice>
-    <mc:Fallback>
+    <mc:Fallback xmlns="">
       <p:transition spd="med">
         <p:fade/>
       </p:transition>
     </mc:Fallback>
   </mc:AlternateContent>
-  <p:timing>
-    <p:tnLst>
-      <p:par>
-        <p:cTn id="1" dur="indefinite" restart="never" nodeType="tmRoot"/>
-      </p:par>
-    </p:tnLst>
-  </p:timing>
 </p:sld>
 </file>
 
@@ -7335,7 +7178,7 @@
   <a:extraClrSchemeLst/>
   <a:extLst>
     <a:ext uri="{05A4C25C-085E-4340-85A3-A5531E510DB2}">
-      <thm15:themeFamily xmlns:thm15="http://schemas.microsoft.com/office/thememl/2012/main" xmlns="" name="Office Theme" id="{62F939B6-93AF-4DB8-9C6B-D6C7DFDC589F}" vid="{4A3C46E8-61CC-4603-A589-7422A47A8E4A}"/>
+      <thm15:themeFamily xmlns:thm15="http://schemas.microsoft.com/office/thememl/2012/main" name="Office Theme" id="{62F939B6-93AF-4DB8-9C6B-D6C7DFDC589F}" vid="{4A3C46E8-61CC-4603-A589-7422A47A8E4A}"/>
     </a:ext>
   </a:extLst>
 </a:theme>
@@ -7584,7 +7427,7 @@
   <a:extraClrSchemeLst/>
   <a:extLst>
     <a:ext uri="{05A4C25C-085E-4340-85A3-A5531E510DB2}">
-      <thm15:themeFamily xmlns:thm15="http://schemas.microsoft.com/office/thememl/2012/main" xmlns="" name="Office Theme" id="{62F939B6-93AF-4DB8-9C6B-D6C7DFDC589F}" vid="{4A3C46E8-61CC-4603-A589-7422A47A8E4A}"/>
+      <thm15:themeFamily xmlns:thm15="http://schemas.microsoft.com/office/thememl/2012/main" name="Office Theme" id="{62F939B6-93AF-4DB8-9C6B-D6C7DFDC589F}" vid="{4A3C46E8-61CC-4603-A589-7422A47A8E4A}"/>
     </a:ext>
   </a:extLst>
 </a:theme>
@@ -7833,13 +7676,19 @@
   <a:extraClrSchemeLst/>
   <a:extLst>
     <a:ext uri="{05A4C25C-085E-4340-85A3-A5531E510DB2}">
-      <thm15:themeFamily xmlns:thm15="http://schemas.microsoft.com/office/thememl/2012/main" xmlns="" name="Office Theme" id="{62F939B6-93AF-4DB8-9C6B-D6C7DFDC589F}" vid="{4A3C46E8-61CC-4603-A589-7422A47A8E4A}"/>
+      <thm15:themeFamily xmlns:thm15="http://schemas.microsoft.com/office/thememl/2012/main" name="Office Theme" id="{62F939B6-93AF-4DB8-9C6B-D6C7DFDC589F}" vid="{4A3C46E8-61CC-4603-A589-7422A47A8E4A}"/>
     </a:ext>
   </a:extLst>
 </a:theme>
 </file>
 
 <file path=customXml/item1.xml><?xml version="1.0" encoding="utf-8"?>
+<p:properties xmlns:p="http://schemas.microsoft.com/office/2006/metadata/properties" xmlns:xsi="http://www.w3.org/2001/XMLSchema-instance" xmlns:pc="http://schemas.microsoft.com/office/infopath/2007/PartnerControls">
+  <documentManagement/>
+</p:properties>
+</file>
+
+<file path=customXml/item2.xml><?xml version="1.0" encoding="utf-8"?>
 <ct:contentTypeSchema xmlns:ct="http://schemas.microsoft.com/office/2006/metadata/contentType" xmlns:ma="http://schemas.microsoft.com/office/2006/metadata/properties/metaAttributes" ct:_="" ma:_="" ma:contentTypeName="Document" ma:contentTypeID="0x0101007C1D5F340F01F94FA2FD29A5E6DC872E" ma:contentTypeVersion="0" ma:contentTypeDescription="Create a new document." ma:contentTypeScope="" ma:versionID="f583bd66513a361a730282b6a794e352">
   <xsd:schema xmlns:xsd="http://www.w3.org/2001/XMLSchema" xmlns:xs="http://www.w3.org/2001/XMLSchema" xmlns:p="http://schemas.microsoft.com/office/2006/metadata/properties" targetNamespace="http://schemas.microsoft.com/office/2006/metadata/properties" ma:root="true" ma:fieldsID="6841151cf538834e171094e4faaf2d73">
     <xsd:element name="properties">
@@ -7953,7 +7802,7 @@
 </ct:contentTypeSchema>
 </file>
 
-<file path=customXml/item2.xml><?xml version="1.0" encoding="utf-8"?>
+<file path=customXml/item3.xml><?xml version="1.0" encoding="utf-8"?>
 <?mso-contentType ?>
 <FormTemplates xmlns="http://schemas.microsoft.com/sharepoint/v3/contenttype/forms">
   <Display>DocumentLibraryForm</Display>
@@ -7962,13 +7811,16 @@
 </FormTemplates>
 </file>
 
-<file path=customXml/item3.xml><?xml version="1.0" encoding="utf-8"?>
-<p:properties xmlns:p="http://schemas.microsoft.com/office/2006/metadata/properties" xmlns:xsi="http://www.w3.org/2001/XMLSchema-instance" xmlns:pc="http://schemas.microsoft.com/office/infopath/2007/PartnerControls">
-  <documentManagement/>
-</p:properties>
+<file path=customXml/itemProps1.xml><?xml version="1.0" encoding="utf-8"?>
+<ds:datastoreItem xmlns:ds="http://schemas.openxmlformats.org/officeDocument/2006/customXml" ds:itemID="{AC159749-484A-4444-8368-710F51146B8D}">
+  <ds:schemaRefs>
+    <ds:schemaRef ds:uri="http://schemas.microsoft.com/office/2006/metadata/properties"/>
+    <ds:schemaRef ds:uri="http://schemas.microsoft.com/office/infopath/2007/PartnerControls"/>
+  </ds:schemaRefs>
+</ds:datastoreItem>
 </file>
 
-<file path=customXml/itemProps1.xml><?xml version="1.0" encoding="utf-8"?>
+<file path=customXml/itemProps2.xml><?xml version="1.0" encoding="utf-8"?>
 <ds:datastoreItem xmlns:ds="http://schemas.openxmlformats.org/officeDocument/2006/customXml" ds:itemID="{57E0F479-A72A-4310-AA64-690A596FA534}">
   <ds:schemaRefs>
     <ds:schemaRef ds:uri="http://schemas.microsoft.com/office/2006/metadata/contentType"/>
@@ -7984,25 +7836,10 @@
 </ds:datastoreItem>
 </file>
 
-<file path=customXml/itemProps2.xml><?xml version="1.0" encoding="utf-8"?>
+<file path=customXml/itemProps3.xml><?xml version="1.0" encoding="utf-8"?>
 <ds:datastoreItem xmlns:ds="http://schemas.openxmlformats.org/officeDocument/2006/customXml" ds:itemID="{5F22C80C-2A12-4ADF-A25C-A987BFB8D79E}">
   <ds:schemaRefs>
     <ds:schemaRef ds:uri="http://schemas.microsoft.com/sharepoint/v3/contenttype/forms"/>
   </ds:schemaRefs>
 </ds:datastoreItem>
-</file>
-
-<file path=customXml/itemProps3.xml><?xml version="1.0" encoding="utf-8"?>
-<ds:datastoreItem xmlns:ds="http://schemas.openxmlformats.org/officeDocument/2006/customXml" ds:itemID="{AC159749-484A-4444-8368-710F51146B8D}">
-  <ds:schemaRefs>
-    <ds:schemaRef ds:uri="http://schemas.openxmlformats.org/package/2006/metadata/core-properties"/>
-    <ds:schemaRef ds:uri="http://purl.org/dc/dcmitype/"/>
-    <ds:schemaRef ds:uri="http://schemas.microsoft.com/office/2006/documentManagement/types"/>
-    <ds:schemaRef ds:uri="http://purl.org/dc/elements/1.1/"/>
-    <ds:schemaRef ds:uri="http://schemas.microsoft.com/office/2006/metadata/properties"/>
-    <ds:schemaRef ds:uri="http://purl.org/dc/terms/"/>
-    <ds:schemaRef ds:uri="http://schemas.microsoft.com/office/infopath/2007/PartnerControls"/>
-    <ds:schemaRef ds:uri="http://www.w3.org/XML/1998/namespace"/>
-  </ds:schemaRefs>
-</ds:datastoreItem>
 </file>
</xml_diff>